<commit_message>
refinement: Remove slide transitions from Disciplined Engineering presentation
Change-Id: Ie49db0e157dee30fc54cf9281e1d65e1d454aff0
</commit_message>
<xml_diff>
--- a/plugins/org.eclipse.osee.support.admin/presentations_publications/Disciplined_Engineering_with_OSEE.pptx
+++ b/plugins/org.eclipse.osee.support.admin/presentations_publications/Disciplined_Engineering_with_OSEE.pptx
@@ -1863,16 +1863,12 @@
   <p:clrMapOvr>
     <a:masterClrMapping/>
   </p:clrMapOvr>
-  <mc:AlternateContent xmlns:mc="http://schemas.openxmlformats.org/markup-compatibility/2006" xmlns:p14="http://schemas.microsoft.com/office/powerpoint/2010/main">
-    <mc:Choice Requires="p14">
-      <p:transition spd="med" p14:dur="700">
-        <p:fade/>
-      </p:transition>
+  <mc:AlternateContent xmlns:mc="http://schemas.openxmlformats.org/markup-compatibility/2006">
+    <mc:Choice xmlns:p14="http://schemas.microsoft.com/office/powerpoint/2010/main" Requires="p14">
+      <p:transition p14:dur="0"/>
     </mc:Choice>
-    <mc:Fallback xmlns="">
-      <p:transition spd="med">
-        <p:fade/>
-      </p:transition>
+    <mc:Fallback>
+      <p:transition/>
     </mc:Fallback>
   </mc:AlternateContent>
 </p:sldLayout>
@@ -4387,16 +4383,12 @@
   <p:clrMapOvr>
     <a:masterClrMapping/>
   </p:clrMapOvr>
-  <mc:AlternateContent xmlns:mc="http://schemas.openxmlformats.org/markup-compatibility/2006" xmlns:p14="http://schemas.microsoft.com/office/powerpoint/2010/main">
-    <mc:Choice Requires="p14">
-      <p:transition spd="med" p14:dur="700">
-        <p:fade/>
-      </p:transition>
+  <mc:AlternateContent xmlns:mc="http://schemas.openxmlformats.org/markup-compatibility/2006">
+    <mc:Choice xmlns:p14="http://schemas.microsoft.com/office/powerpoint/2010/main" Requires="p14">
+      <p:transition p14:dur="0"/>
     </mc:Choice>
-    <mc:Fallback xmlns="">
-      <p:transition spd="med">
-        <p:fade/>
-      </p:transition>
+    <mc:Fallback>
+      <p:transition/>
     </mc:Fallback>
   </mc:AlternateContent>
 </p:sldLayout>
@@ -4585,16 +4577,12 @@
   <p:clrMapOvr>
     <a:masterClrMapping/>
   </p:clrMapOvr>
-  <mc:AlternateContent xmlns:mc="http://schemas.openxmlformats.org/markup-compatibility/2006" xmlns:p14="http://schemas.microsoft.com/office/powerpoint/2010/main">
-    <mc:Choice Requires="p14">
-      <p:transition spd="med" p14:dur="700">
-        <p:fade/>
-      </p:transition>
+  <mc:AlternateContent xmlns:mc="http://schemas.openxmlformats.org/markup-compatibility/2006">
+    <mc:Choice xmlns:p14="http://schemas.microsoft.com/office/powerpoint/2010/main" Requires="p14">
+      <p:transition p14:dur="0"/>
     </mc:Choice>
-    <mc:Fallback xmlns="">
-      <p:transition spd="med">
-        <p:fade/>
-      </p:transition>
+    <mc:Fallback>
+      <p:transition/>
     </mc:Fallback>
   </mc:AlternateContent>
 </p:sldLayout>
@@ -4723,16 +4711,12 @@
   <p:clrMapOvr>
     <a:masterClrMapping/>
   </p:clrMapOvr>
-  <mc:AlternateContent xmlns:mc="http://schemas.openxmlformats.org/markup-compatibility/2006" xmlns:p14="http://schemas.microsoft.com/office/powerpoint/2010/main">
-    <mc:Choice Requires="p14">
-      <p:transition spd="med" p14:dur="700">
-        <p:fade/>
-      </p:transition>
+  <mc:AlternateContent xmlns:mc="http://schemas.openxmlformats.org/markup-compatibility/2006">
+    <mc:Choice xmlns:p14="http://schemas.microsoft.com/office/powerpoint/2010/main" Requires="p14">
+      <p:transition p14:dur="0"/>
     </mc:Choice>
-    <mc:Fallback xmlns="">
-      <p:transition spd="med">
-        <p:fade/>
-      </p:transition>
+    <mc:Fallback>
+      <p:transition/>
     </mc:Fallback>
   </mc:AlternateContent>
 </p:sldLayout>
@@ -4765,16 +4749,12 @@
   <p:clrMapOvr>
     <a:masterClrMapping/>
   </p:clrMapOvr>
-  <mc:AlternateContent xmlns:mc="http://schemas.openxmlformats.org/markup-compatibility/2006" xmlns:p14="http://schemas.microsoft.com/office/powerpoint/2010/main">
-    <mc:Choice Requires="p14">
-      <p:transition spd="med" p14:dur="700">
-        <p:fade/>
-      </p:transition>
+  <mc:AlternateContent xmlns:mc="http://schemas.openxmlformats.org/markup-compatibility/2006">
+    <mc:Choice xmlns:p14="http://schemas.microsoft.com/office/powerpoint/2010/main" Requires="p14">
+      <p:transition p14:dur="0"/>
     </mc:Choice>
-    <mc:Fallback xmlns="">
-      <p:transition spd="med">
-        <p:fade/>
-      </p:transition>
+    <mc:Fallback>
+      <p:transition/>
     </mc:Fallback>
   </mc:AlternateContent>
 </p:sldLayout>
@@ -4895,16 +4875,12 @@
   <p:clrMapOvr>
     <a:masterClrMapping/>
   </p:clrMapOvr>
-  <mc:AlternateContent xmlns:mc="http://schemas.openxmlformats.org/markup-compatibility/2006" xmlns:p14="http://schemas.microsoft.com/office/powerpoint/2010/main">
-    <mc:Choice Requires="p14">
-      <p:transition spd="med" p14:dur="700">
-        <p:fade/>
-      </p:transition>
+  <mc:AlternateContent xmlns:mc="http://schemas.openxmlformats.org/markup-compatibility/2006">
+    <mc:Choice xmlns:p14="http://schemas.microsoft.com/office/powerpoint/2010/main" Requires="p14">
+      <p:transition p14:dur="0"/>
     </mc:Choice>
-    <mc:Fallback xmlns="">
-      <p:transition spd="med">
-        <p:fade/>
-      </p:transition>
+    <mc:Fallback>
+      <p:transition/>
     </mc:Fallback>
   </mc:AlternateContent>
 </p:sldLayout>
@@ -5141,16 +5117,12 @@
   <p:clrMapOvr>
     <a:masterClrMapping/>
   </p:clrMapOvr>
-  <mc:AlternateContent xmlns:mc="http://schemas.openxmlformats.org/markup-compatibility/2006" xmlns:p14="http://schemas.microsoft.com/office/powerpoint/2010/main">
-    <mc:Choice Requires="p14">
-      <p:transition spd="med" p14:dur="700">
-        <p:fade/>
-      </p:transition>
+  <mc:AlternateContent xmlns:mc="http://schemas.openxmlformats.org/markup-compatibility/2006">
+    <mc:Choice xmlns:p14="http://schemas.microsoft.com/office/powerpoint/2010/main" Requires="p14">
+      <p:transition p14:dur="0"/>
     </mc:Choice>
-    <mc:Fallback xmlns="">
-      <p:transition spd="med">
-        <p:fade/>
-      </p:transition>
+    <mc:Fallback>
+      <p:transition/>
     </mc:Fallback>
   </mc:AlternateContent>
 </p:sldLayout>
@@ -5522,16 +5494,12 @@
   <p:clrMapOvr>
     <a:masterClrMapping/>
   </p:clrMapOvr>
-  <mc:AlternateContent xmlns:mc="http://schemas.openxmlformats.org/markup-compatibility/2006" xmlns:p14="http://schemas.microsoft.com/office/powerpoint/2010/main">
-    <mc:Choice Requires="p14">
-      <p:transition spd="med" p14:dur="700">
-        <p:fade/>
-      </p:transition>
+  <mc:AlternateContent xmlns:mc="http://schemas.openxmlformats.org/markup-compatibility/2006">
+    <mc:Choice xmlns:p14="http://schemas.microsoft.com/office/powerpoint/2010/main" Requires="p14">
+      <p:transition p14:dur="0"/>
     </mc:Choice>
-    <mc:Fallback xmlns="">
-      <p:transition spd="med">
-        <p:fade/>
-      </p:transition>
+    <mc:Fallback>
+      <p:transition/>
     </mc:Fallback>
   </mc:AlternateContent>
 </p:sldLayout>
@@ -5866,16 +5834,12 @@
   <p:clrMapOvr>
     <a:masterClrMapping/>
   </p:clrMapOvr>
-  <mc:AlternateContent xmlns:mc="http://schemas.openxmlformats.org/markup-compatibility/2006" xmlns:p14="http://schemas.microsoft.com/office/powerpoint/2010/main">
-    <mc:Choice Requires="p14">
-      <p:transition spd="med" p14:dur="700">
-        <p:fade/>
-      </p:transition>
+  <mc:AlternateContent xmlns:mc="http://schemas.openxmlformats.org/markup-compatibility/2006">
+    <mc:Choice xmlns:p14="http://schemas.microsoft.com/office/powerpoint/2010/main" Requires="p14">
+      <p:transition p14:dur="0"/>
     </mc:Choice>
-    <mc:Fallback xmlns="">
-      <p:transition spd="med">
-        <p:fade/>
-      </p:transition>
+    <mc:Fallback>
+      <p:transition/>
     </mc:Fallback>
   </mc:AlternateContent>
 </p:sldLayout>
@@ -6446,16 +6410,12 @@
   <p:clrMapOvr>
     <a:masterClrMapping/>
   </p:clrMapOvr>
-  <mc:AlternateContent xmlns:mc="http://schemas.openxmlformats.org/markup-compatibility/2006" xmlns:p14="http://schemas.microsoft.com/office/powerpoint/2010/main">
-    <mc:Choice Requires="p14">
-      <p:transition spd="med" p14:dur="700">
-        <p:fade/>
-      </p:transition>
+  <mc:AlternateContent xmlns:mc="http://schemas.openxmlformats.org/markup-compatibility/2006">
+    <mc:Choice xmlns:p14="http://schemas.microsoft.com/office/powerpoint/2010/main" Requires="p14">
+      <p:transition p14:dur="0"/>
     </mc:Choice>
-    <mc:Fallback xmlns="">
-      <p:transition spd="med">
-        <p:fade/>
-      </p:transition>
+    <mc:Fallback>
+      <p:transition/>
     </mc:Fallback>
   </mc:AlternateContent>
 </p:sldLayout>
@@ -7226,16 +7186,12 @@
   <p:clrMapOvr>
     <a:masterClrMapping/>
   </p:clrMapOvr>
-  <mc:AlternateContent xmlns:mc="http://schemas.openxmlformats.org/markup-compatibility/2006" xmlns:p14="http://schemas.microsoft.com/office/powerpoint/2010/main">
-    <mc:Choice Requires="p14">
-      <p:transition spd="med" p14:dur="700">
-        <p:fade/>
-      </p:transition>
+  <mc:AlternateContent xmlns:mc="http://schemas.openxmlformats.org/markup-compatibility/2006">
+    <mc:Choice xmlns:p14="http://schemas.microsoft.com/office/powerpoint/2010/main" Requires="p14">
+      <p:transition p14:dur="0"/>
     </mc:Choice>
-    <mc:Fallback xmlns="">
-      <p:transition spd="med">
-        <p:fade/>
-      </p:transition>
+    <mc:Fallback>
+      <p:transition/>
     </mc:Fallback>
   </mc:AlternateContent>
 </p:sldLayout>
@@ -7472,16 +7428,12 @@
   <p:clrMapOvr>
     <a:masterClrMapping/>
   </p:clrMapOvr>
-  <mc:AlternateContent xmlns:mc="http://schemas.openxmlformats.org/markup-compatibility/2006" xmlns:p14="http://schemas.microsoft.com/office/powerpoint/2010/main">
-    <mc:Choice Requires="p14">
-      <p:transition spd="med" p14:dur="700">
-        <p:fade/>
-      </p:transition>
+  <mc:AlternateContent xmlns:mc="http://schemas.openxmlformats.org/markup-compatibility/2006">
+    <mc:Choice xmlns:p14="http://schemas.microsoft.com/office/powerpoint/2010/main" Requires="p14">
+      <p:transition p14:dur="0"/>
     </mc:Choice>
-    <mc:Fallback xmlns="">
-      <p:transition spd="med">
-        <p:fade/>
-      </p:transition>
+    <mc:Fallback>
+      <p:transition/>
     </mc:Fallback>
   </mc:AlternateContent>
 </p:sldLayout>
@@ -7670,16 +7622,12 @@
   <p:clrMapOvr>
     <a:masterClrMapping/>
   </p:clrMapOvr>
-  <mc:AlternateContent xmlns:mc="http://schemas.openxmlformats.org/markup-compatibility/2006" xmlns:p14="http://schemas.microsoft.com/office/powerpoint/2010/main">
-    <mc:Choice Requires="p14">
-      <p:transition spd="med" p14:dur="700">
-        <p:fade/>
-      </p:transition>
+  <mc:AlternateContent xmlns:mc="http://schemas.openxmlformats.org/markup-compatibility/2006">
+    <mc:Choice xmlns:p14="http://schemas.microsoft.com/office/powerpoint/2010/main" Requires="p14">
+      <p:transition p14:dur="0"/>
     </mc:Choice>
-    <mc:Fallback xmlns="">
-      <p:transition spd="med">
-        <p:fade/>
-      </p:transition>
+    <mc:Fallback>
+      <p:transition/>
     </mc:Fallback>
   </mc:AlternateContent>
 </p:sldLayout>
@@ -7808,16 +7756,12 @@
   <p:clrMapOvr>
     <a:masterClrMapping/>
   </p:clrMapOvr>
-  <mc:AlternateContent xmlns:mc="http://schemas.openxmlformats.org/markup-compatibility/2006" xmlns:p14="http://schemas.microsoft.com/office/powerpoint/2010/main">
-    <mc:Choice Requires="p14">
-      <p:transition spd="med" p14:dur="700">
-        <p:fade/>
-      </p:transition>
+  <mc:AlternateContent xmlns:mc="http://schemas.openxmlformats.org/markup-compatibility/2006">
+    <mc:Choice xmlns:p14="http://schemas.microsoft.com/office/powerpoint/2010/main" Requires="p14">
+      <p:transition p14:dur="0"/>
     </mc:Choice>
-    <mc:Fallback xmlns="">
-      <p:transition spd="med">
-        <p:fade/>
-      </p:transition>
+    <mc:Fallback>
+      <p:transition/>
     </mc:Fallback>
   </mc:AlternateContent>
 </p:sldLayout>
@@ -7850,16 +7794,12 @@
   <p:clrMapOvr>
     <a:masterClrMapping/>
   </p:clrMapOvr>
-  <mc:AlternateContent xmlns:mc="http://schemas.openxmlformats.org/markup-compatibility/2006" xmlns:p14="http://schemas.microsoft.com/office/powerpoint/2010/main">
-    <mc:Choice Requires="p14">
-      <p:transition spd="med" p14:dur="700">
-        <p:fade/>
-      </p:transition>
+  <mc:AlternateContent xmlns:mc="http://schemas.openxmlformats.org/markup-compatibility/2006">
+    <mc:Choice xmlns:p14="http://schemas.microsoft.com/office/powerpoint/2010/main" Requires="p14">
+      <p:transition p14:dur="0"/>
     </mc:Choice>
-    <mc:Fallback xmlns="">
-      <p:transition spd="med">
-        <p:fade/>
-      </p:transition>
+    <mc:Fallback>
+      <p:transition/>
     </mc:Fallback>
   </mc:AlternateContent>
 </p:sldLayout>
@@ -7980,16 +7920,12 @@
   <p:clrMapOvr>
     <a:masterClrMapping/>
   </p:clrMapOvr>
-  <mc:AlternateContent xmlns:mc="http://schemas.openxmlformats.org/markup-compatibility/2006" xmlns:p14="http://schemas.microsoft.com/office/powerpoint/2010/main">
-    <mc:Choice Requires="p14">
-      <p:transition spd="med" p14:dur="700">
-        <p:fade/>
-      </p:transition>
+  <mc:AlternateContent xmlns:mc="http://schemas.openxmlformats.org/markup-compatibility/2006">
+    <mc:Choice xmlns:p14="http://schemas.microsoft.com/office/powerpoint/2010/main" Requires="p14">
+      <p:transition p14:dur="0"/>
     </mc:Choice>
-    <mc:Fallback xmlns="">
-      <p:transition spd="med">
-        <p:fade/>
-      </p:transition>
+    <mc:Fallback>
+      <p:transition/>
     </mc:Fallback>
   </mc:AlternateContent>
 </p:sldLayout>
@@ -8226,16 +8162,12 @@
   <p:clrMapOvr>
     <a:masterClrMapping/>
   </p:clrMapOvr>
-  <mc:AlternateContent xmlns:mc="http://schemas.openxmlformats.org/markup-compatibility/2006" xmlns:p14="http://schemas.microsoft.com/office/powerpoint/2010/main">
-    <mc:Choice Requires="p14">
-      <p:transition spd="med" p14:dur="700">
-        <p:fade/>
-      </p:transition>
+  <mc:AlternateContent xmlns:mc="http://schemas.openxmlformats.org/markup-compatibility/2006">
+    <mc:Choice xmlns:p14="http://schemas.microsoft.com/office/powerpoint/2010/main" Requires="p14">
+      <p:transition p14:dur="0"/>
     </mc:Choice>
-    <mc:Fallback xmlns="">
-      <p:transition spd="med">
-        <p:fade/>
-      </p:transition>
+    <mc:Fallback>
+      <p:transition/>
     </mc:Fallback>
   </mc:AlternateContent>
 </p:sldLayout>
@@ -8607,16 +8539,12 @@
   <p:clrMapOvr>
     <a:masterClrMapping/>
   </p:clrMapOvr>
-  <mc:AlternateContent xmlns:mc="http://schemas.openxmlformats.org/markup-compatibility/2006" xmlns:p14="http://schemas.microsoft.com/office/powerpoint/2010/main">
-    <mc:Choice Requires="p14">
-      <p:transition spd="med" p14:dur="700">
-        <p:fade/>
-      </p:transition>
+  <mc:AlternateContent xmlns:mc="http://schemas.openxmlformats.org/markup-compatibility/2006">
+    <mc:Choice xmlns:p14="http://schemas.microsoft.com/office/powerpoint/2010/main" Requires="p14">
+      <p:transition p14:dur="0"/>
     </mc:Choice>
-    <mc:Fallback xmlns="">
-      <p:transition spd="med">
-        <p:fade/>
-      </p:transition>
+    <mc:Fallback>
+      <p:transition/>
     </mc:Fallback>
   </mc:AlternateContent>
 </p:sldLayout>
@@ -8780,9 +8708,14 @@
   <p:clrMapOvr>
     <a:masterClrMapping/>
   </p:clrMapOvr>
-  <p:transition>
-    <p:wipe dir="r"/>
-  </p:transition>
+  <mc:AlternateContent xmlns:mc="http://schemas.openxmlformats.org/markup-compatibility/2006">
+    <mc:Choice xmlns:p14="http://schemas.microsoft.com/office/powerpoint/2010/main" Requires="p14">
+      <p:transition p14:dur="0"/>
+    </mc:Choice>
+    <mc:Fallback>
+      <p:transition/>
+    </mc:Fallback>
+  </mc:AlternateContent>
   <p:timing>
     <p:tnLst>
       <p:par>
@@ -9122,16 +9055,12 @@
   <p:clrMapOvr>
     <a:masterClrMapping/>
   </p:clrMapOvr>
-  <mc:AlternateContent xmlns:mc="http://schemas.openxmlformats.org/markup-compatibility/2006" xmlns:p14="http://schemas.microsoft.com/office/powerpoint/2010/main">
-    <mc:Choice Requires="p14">
-      <p:transition spd="med" p14:dur="700">
-        <p:fade/>
-      </p:transition>
+  <mc:AlternateContent xmlns:mc="http://schemas.openxmlformats.org/markup-compatibility/2006">
+    <mc:Choice xmlns:p14="http://schemas.microsoft.com/office/powerpoint/2010/main" Requires="p14">
+      <p:transition p14:dur="0"/>
     </mc:Choice>
-    <mc:Fallback xmlns="">
-      <p:transition spd="med">
-        <p:fade/>
-      </p:transition>
+    <mc:Fallback>
+      <p:transition/>
     </mc:Fallback>
   </mc:AlternateContent>
 </p:sldLayout>
@@ -9702,16 +9631,12 @@
   <p:clrMapOvr>
     <a:masterClrMapping/>
   </p:clrMapOvr>
-  <mc:AlternateContent xmlns:mc="http://schemas.openxmlformats.org/markup-compatibility/2006" xmlns:p14="http://schemas.microsoft.com/office/powerpoint/2010/main">
-    <mc:Choice Requires="p14">
-      <p:transition spd="med" p14:dur="700">
-        <p:fade/>
-      </p:transition>
+  <mc:AlternateContent xmlns:mc="http://schemas.openxmlformats.org/markup-compatibility/2006">
+    <mc:Choice xmlns:p14="http://schemas.microsoft.com/office/powerpoint/2010/main" Requires="p14">
+      <p:transition p14:dur="0"/>
     </mc:Choice>
-    <mc:Fallback xmlns="">
-      <p:transition spd="med">
-        <p:fade/>
-      </p:transition>
+    <mc:Fallback>
+      <p:transition/>
     </mc:Fallback>
   </mc:AlternateContent>
 </p:sldLayout>
@@ -10550,16 +10475,12 @@
   <p:clrMapOvr>
     <a:masterClrMapping/>
   </p:clrMapOvr>
-  <mc:AlternateContent xmlns:mc="http://schemas.openxmlformats.org/markup-compatibility/2006" xmlns:p14="http://schemas.microsoft.com/office/powerpoint/2010/main">
-    <mc:Choice Requires="p14">
-      <p:transition spd="med" p14:dur="700">
-        <p:fade/>
-      </p:transition>
+  <mc:AlternateContent xmlns:mc="http://schemas.openxmlformats.org/markup-compatibility/2006">
+    <mc:Choice xmlns:p14="http://schemas.microsoft.com/office/powerpoint/2010/main" Requires="p14">
+      <p:transition p14:dur="0"/>
     </mc:Choice>
-    <mc:Fallback xmlns="">
-      <p:transition spd="med">
-        <p:fade/>
-      </p:transition>
+    <mc:Fallback>
+      <p:transition/>
     </mc:Fallback>
   </mc:AlternateContent>
 </p:sldLayout>
@@ -10736,16 +10657,12 @@
   <p:clrMapOvr>
     <a:masterClrMapping/>
   </p:clrMapOvr>
-  <mc:AlternateContent xmlns:mc="http://schemas.openxmlformats.org/markup-compatibility/2006" xmlns:p14="http://schemas.microsoft.com/office/powerpoint/2010/main">
-    <mc:Choice Requires="p14">
-      <p:transition spd="med" p14:dur="700">
-        <p:fade/>
-      </p:transition>
+  <mc:AlternateContent xmlns:mc="http://schemas.openxmlformats.org/markup-compatibility/2006">
+    <mc:Choice xmlns:p14="http://schemas.microsoft.com/office/powerpoint/2010/main" Requires="p14">
+      <p:transition p14:dur="0"/>
     </mc:Choice>
-    <mc:Fallback xmlns="">
-      <p:transition spd="med">
-        <p:fade/>
-      </p:transition>
+    <mc:Fallback>
+      <p:transition/>
     </mc:Fallback>
   </mc:AlternateContent>
 </p:sldLayout>
@@ -10934,16 +10851,12 @@
   <p:clrMapOvr>
     <a:masterClrMapping/>
   </p:clrMapOvr>
-  <mc:AlternateContent xmlns:mc="http://schemas.openxmlformats.org/markup-compatibility/2006" xmlns:p14="http://schemas.microsoft.com/office/powerpoint/2010/main">
-    <mc:Choice Requires="p14">
-      <p:transition spd="med" p14:dur="700">
-        <p:fade/>
-      </p:transition>
+  <mc:AlternateContent xmlns:mc="http://schemas.openxmlformats.org/markup-compatibility/2006">
+    <mc:Choice xmlns:p14="http://schemas.microsoft.com/office/powerpoint/2010/main" Requires="p14">
+      <p:transition p14:dur="0"/>
     </mc:Choice>
-    <mc:Fallback xmlns="">
-      <p:transition spd="med">
-        <p:fade/>
-      </p:transition>
+    <mc:Fallback>
+      <p:transition/>
     </mc:Fallback>
   </mc:AlternateContent>
 </p:sldLayout>
@@ -11072,16 +10985,12 @@
   <p:clrMapOvr>
     <a:masterClrMapping/>
   </p:clrMapOvr>
-  <mc:AlternateContent xmlns:mc="http://schemas.openxmlformats.org/markup-compatibility/2006" xmlns:p14="http://schemas.microsoft.com/office/powerpoint/2010/main">
-    <mc:Choice Requires="p14">
-      <p:transition spd="med" p14:dur="700">
-        <p:fade/>
-      </p:transition>
+  <mc:AlternateContent xmlns:mc="http://schemas.openxmlformats.org/markup-compatibility/2006">
+    <mc:Choice xmlns:p14="http://schemas.microsoft.com/office/powerpoint/2010/main" Requires="p14">
+      <p:transition p14:dur="0"/>
     </mc:Choice>
-    <mc:Fallback xmlns="">
-      <p:transition spd="med">
-        <p:fade/>
-      </p:transition>
+    <mc:Fallback>
+      <p:transition/>
     </mc:Fallback>
   </mc:AlternateContent>
 </p:sldLayout>
@@ -11114,16 +11023,12 @@
   <p:clrMapOvr>
     <a:masterClrMapping/>
   </p:clrMapOvr>
-  <mc:AlternateContent xmlns:mc="http://schemas.openxmlformats.org/markup-compatibility/2006" xmlns:p14="http://schemas.microsoft.com/office/powerpoint/2010/main">
-    <mc:Choice Requires="p14">
-      <p:transition spd="med" p14:dur="700">
-        <p:fade/>
-      </p:transition>
+  <mc:AlternateContent xmlns:mc="http://schemas.openxmlformats.org/markup-compatibility/2006">
+    <mc:Choice xmlns:p14="http://schemas.microsoft.com/office/powerpoint/2010/main" Requires="p14">
+      <p:transition p14:dur="0"/>
     </mc:Choice>
-    <mc:Fallback xmlns="">
-      <p:transition spd="med">
-        <p:fade/>
-      </p:transition>
+    <mc:Fallback>
+      <p:transition/>
     </mc:Fallback>
   </mc:AlternateContent>
 </p:sldLayout>
@@ -11244,16 +11149,12 @@
   <p:clrMapOvr>
     <a:masterClrMapping/>
   </p:clrMapOvr>
-  <mc:AlternateContent xmlns:mc="http://schemas.openxmlformats.org/markup-compatibility/2006" xmlns:p14="http://schemas.microsoft.com/office/powerpoint/2010/main">
-    <mc:Choice Requires="p14">
-      <p:transition spd="med" p14:dur="700">
-        <p:fade/>
-      </p:transition>
+  <mc:AlternateContent xmlns:mc="http://schemas.openxmlformats.org/markup-compatibility/2006">
+    <mc:Choice xmlns:p14="http://schemas.microsoft.com/office/powerpoint/2010/main" Requires="p14">
+      <p:transition p14:dur="0"/>
     </mc:Choice>
-    <mc:Fallback xmlns="">
-      <p:transition spd="med">
-        <p:fade/>
-      </p:transition>
+    <mc:Fallback>
+      <p:transition/>
     </mc:Fallback>
   </mc:AlternateContent>
 </p:sldLayout>
@@ -11490,16 +11391,12 @@
   <p:clrMapOvr>
     <a:masterClrMapping/>
   </p:clrMapOvr>
-  <mc:AlternateContent xmlns:mc="http://schemas.openxmlformats.org/markup-compatibility/2006" xmlns:p14="http://schemas.microsoft.com/office/powerpoint/2010/main">
-    <mc:Choice Requires="p14">
-      <p:transition spd="med" p14:dur="700">
-        <p:fade/>
-      </p:transition>
+  <mc:AlternateContent xmlns:mc="http://schemas.openxmlformats.org/markup-compatibility/2006">
+    <mc:Choice xmlns:p14="http://schemas.microsoft.com/office/powerpoint/2010/main" Requires="p14">
+      <p:transition p14:dur="0"/>
     </mc:Choice>
-    <mc:Fallback xmlns="">
-      <p:transition spd="med">
-        <p:fade/>
-      </p:transition>
+    <mc:Fallback>
+      <p:transition/>
     </mc:Fallback>
   </mc:AlternateContent>
 </p:sldLayout>
@@ -11871,16 +11768,12 @@
   <p:clrMapOvr>
     <a:masterClrMapping/>
   </p:clrMapOvr>
-  <mc:AlternateContent xmlns:mc="http://schemas.openxmlformats.org/markup-compatibility/2006" xmlns:p14="http://schemas.microsoft.com/office/powerpoint/2010/main">
-    <mc:Choice Requires="p14">
-      <p:transition spd="med" p14:dur="700">
-        <p:fade/>
-      </p:transition>
+  <mc:AlternateContent xmlns:mc="http://schemas.openxmlformats.org/markup-compatibility/2006">
+    <mc:Choice xmlns:p14="http://schemas.microsoft.com/office/powerpoint/2010/main" Requires="p14">
+      <p:transition p14:dur="0"/>
     </mc:Choice>
-    <mc:Fallback xmlns="">
-      <p:transition spd="med">
-        <p:fade/>
-      </p:transition>
+    <mc:Fallback>
+      <p:transition/>
     </mc:Fallback>
   </mc:AlternateContent>
 </p:sldLayout>
@@ -12044,9 +11937,14 @@
   <p:clrMapOvr>
     <a:masterClrMapping/>
   </p:clrMapOvr>
-  <p:transition>
-    <p:wipe dir="r"/>
-  </p:transition>
+  <mc:AlternateContent xmlns:mc="http://schemas.openxmlformats.org/markup-compatibility/2006">
+    <mc:Choice xmlns:p14="http://schemas.microsoft.com/office/powerpoint/2010/main" Requires="p14">
+      <p:transition p14:dur="0"/>
+    </mc:Choice>
+    <mc:Fallback>
+      <p:transition/>
+    </mc:Fallback>
+  </mc:AlternateContent>
   <p:timing>
     <p:tnLst>
       <p:par>
@@ -12148,7 +12046,7 @@
                 </a:solidFill>
               </a:rPr>
               <a:pPr/>
-              <a:t>4/21/2021</a:t>
+              <a:t>6/10/2021</a:t>
             </a:fld>
             <a:r>
               <a:rPr lang="en-US" smtClean="0">
@@ -12631,6 +12529,14 @@
   <p:clrMapOvr>
     <a:masterClrMapping/>
   </p:clrMapOvr>
+  <mc:AlternateContent xmlns:mc="http://schemas.openxmlformats.org/markup-compatibility/2006">
+    <mc:Choice xmlns:p14="http://schemas.microsoft.com/office/powerpoint/2010/main" Requires="p14">
+      <p:transition p14:dur="0"/>
+    </mc:Choice>
+    <mc:Fallback>
+      <p:transition/>
+    </mc:Fallback>
+  </mc:AlternateContent>
   <p:timing>
     <p:tnLst>
       <p:par>
@@ -12799,6 +12705,14 @@
   <p:clrMapOvr>
     <a:masterClrMapping/>
   </p:clrMapOvr>
+  <mc:AlternateContent xmlns:mc="http://schemas.openxmlformats.org/markup-compatibility/2006">
+    <mc:Choice xmlns:p14="http://schemas.microsoft.com/office/powerpoint/2010/main" Requires="p14">
+      <p:transition p14:dur="0"/>
+    </mc:Choice>
+    <mc:Fallback>
+      <p:transition/>
+    </mc:Fallback>
+  </mc:AlternateContent>
 </p:sldLayout>
 </file>
 
@@ -12981,6 +12895,14 @@
   <p:clrMapOvr>
     <a:masterClrMapping/>
   </p:clrMapOvr>
+  <mc:AlternateContent xmlns:mc="http://schemas.openxmlformats.org/markup-compatibility/2006">
+    <mc:Choice xmlns:p14="http://schemas.microsoft.com/office/powerpoint/2010/main" Requires="p14">
+      <p:transition p14:dur="0"/>
+    </mc:Choice>
+    <mc:Fallback>
+      <p:transition/>
+    </mc:Fallback>
+  </mc:AlternateContent>
 </p:sldLayout>
 </file>
 
@@ -13059,16 +12981,12 @@
   <p:clrMapOvr>
     <a:masterClrMapping/>
   </p:clrMapOvr>
-  <mc:AlternateContent xmlns:mc="http://schemas.openxmlformats.org/markup-compatibility/2006" xmlns:p14="http://schemas.microsoft.com/office/powerpoint/2010/main">
-    <mc:Choice Requires="p14">
-      <p:transition spd="med" p14:dur="700">
-        <p:fade/>
-      </p:transition>
+  <mc:AlternateContent xmlns:mc="http://schemas.openxmlformats.org/markup-compatibility/2006">
+    <mc:Choice xmlns:p14="http://schemas.microsoft.com/office/powerpoint/2010/main" Requires="p14">
+      <p:transition p14:dur="0"/>
     </mc:Choice>
-    <mc:Fallback xmlns="">
-      <p:transition spd="med">
-        <p:fade/>
-      </p:transition>
+    <mc:Fallback>
+      <p:transition/>
     </mc:Fallback>
   </mc:AlternateContent>
 </p:sldLayout>
@@ -13160,11 +13078,11 @@
   <p:clrMapOvr>
     <a:masterClrMapping/>
   </p:clrMapOvr>
-  <mc:AlternateContent xmlns:mc="http://schemas.openxmlformats.org/markup-compatibility/2006" xmlns:p14="http://schemas.microsoft.com/office/powerpoint/2010/main">
-    <mc:Choice Requires="p14">
+  <mc:AlternateContent xmlns:mc="http://schemas.openxmlformats.org/markup-compatibility/2006">
+    <mc:Choice xmlns:p14="http://schemas.microsoft.com/office/powerpoint/2010/main" Requires="p14">
       <p:transition p14:dur="0"/>
     </mc:Choice>
-    <mc:Fallback xmlns="">
+    <mc:Fallback>
       <p:transition/>
     </mc:Fallback>
   </mc:AlternateContent>
@@ -13621,11 +13539,11 @@
   <p:clrMapOvr>
     <a:masterClrMapping/>
   </p:clrMapOvr>
-  <mc:AlternateContent xmlns:mc="http://schemas.openxmlformats.org/markup-compatibility/2006" xmlns:p14="http://schemas.microsoft.com/office/powerpoint/2010/main">
-    <mc:Choice Requires="p14">
+  <mc:AlternateContent xmlns:mc="http://schemas.openxmlformats.org/markup-compatibility/2006">
+    <mc:Choice xmlns:p14="http://schemas.microsoft.com/office/powerpoint/2010/main" Requires="p14">
       <p:transition p14:dur="0"/>
     </mc:Choice>
-    <mc:Fallback xmlns="">
+    <mc:Fallback>
       <p:transition/>
     </mc:Fallback>
   </mc:AlternateContent>
@@ -14287,11 +14205,11 @@
   <p:clrMapOvr>
     <a:masterClrMapping/>
   </p:clrMapOvr>
-  <mc:AlternateContent xmlns:mc="http://schemas.openxmlformats.org/markup-compatibility/2006" xmlns:p14="http://schemas.microsoft.com/office/powerpoint/2010/main">
-    <mc:Choice Requires="p14">
+  <mc:AlternateContent xmlns:mc="http://schemas.openxmlformats.org/markup-compatibility/2006">
+    <mc:Choice xmlns:p14="http://schemas.microsoft.com/office/powerpoint/2010/main" Requires="p14">
       <p:transition p14:dur="0"/>
     </mc:Choice>
-    <mc:Fallback xmlns="">
+    <mc:Fallback>
       <p:transition/>
     </mc:Fallback>
   </mc:AlternateContent>
@@ -14556,11 +14474,11 @@
   <p:clrMapOvr>
     <a:masterClrMapping/>
   </p:clrMapOvr>
-  <mc:AlternateContent xmlns:mc="http://schemas.openxmlformats.org/markup-compatibility/2006" xmlns:p14="http://schemas.microsoft.com/office/powerpoint/2010/main">
-    <mc:Choice Requires="p14">
+  <mc:AlternateContent xmlns:mc="http://schemas.openxmlformats.org/markup-compatibility/2006">
+    <mc:Choice xmlns:p14="http://schemas.microsoft.com/office/powerpoint/2010/main" Requires="p14">
       <p:transition p14:dur="0"/>
     </mc:Choice>
-    <mc:Fallback xmlns="">
+    <mc:Fallback>
       <p:transition/>
     </mc:Fallback>
   </mc:AlternateContent>
@@ -14764,11 +14682,11 @@
   <p:clrMapOvr>
     <a:masterClrMapping/>
   </p:clrMapOvr>
-  <mc:AlternateContent xmlns:mc="http://schemas.openxmlformats.org/markup-compatibility/2006" xmlns:p14="http://schemas.microsoft.com/office/powerpoint/2010/main">
-    <mc:Choice Requires="p14">
+  <mc:AlternateContent xmlns:mc="http://schemas.openxmlformats.org/markup-compatibility/2006">
+    <mc:Choice xmlns:p14="http://schemas.microsoft.com/office/powerpoint/2010/main" Requires="p14">
       <p:transition p14:dur="0"/>
     </mc:Choice>
-    <mc:Fallback xmlns="">
+    <mc:Fallback>
       <p:transition/>
     </mc:Fallback>
   </mc:AlternateContent>
@@ -14875,11 +14793,11 @@
   <p:clrMapOvr>
     <a:masterClrMapping/>
   </p:clrMapOvr>
-  <mc:AlternateContent xmlns:mc="http://schemas.openxmlformats.org/markup-compatibility/2006" xmlns:p14="http://schemas.microsoft.com/office/powerpoint/2010/main">
-    <mc:Choice Requires="p14">
+  <mc:AlternateContent xmlns:mc="http://schemas.openxmlformats.org/markup-compatibility/2006">
+    <mc:Choice xmlns:p14="http://schemas.microsoft.com/office/powerpoint/2010/main" Requires="p14">
       <p:transition p14:dur="0"/>
     </mc:Choice>
-    <mc:Fallback xmlns="">
+    <mc:Fallback>
       <p:transition/>
     </mc:Fallback>
   </mc:AlternateContent>
@@ -15081,11 +14999,11 @@
   <p:clrMapOvr>
     <a:masterClrMapping/>
   </p:clrMapOvr>
-  <mc:AlternateContent xmlns:mc="http://schemas.openxmlformats.org/markup-compatibility/2006" xmlns:p14="http://schemas.microsoft.com/office/powerpoint/2010/main">
-    <mc:Choice Requires="p14">
+  <mc:AlternateContent xmlns:mc="http://schemas.openxmlformats.org/markup-compatibility/2006">
+    <mc:Choice xmlns:p14="http://schemas.microsoft.com/office/powerpoint/2010/main" Requires="p14">
       <p:transition p14:dur="0"/>
     </mc:Choice>
-    <mc:Fallback xmlns="">
+    <mc:Fallback>
       <p:transition/>
     </mc:Fallback>
   </mc:AlternateContent>
@@ -15396,11 +15314,11 @@
   <p:clrMapOvr>
     <a:masterClrMapping/>
   </p:clrMapOvr>
-  <mc:AlternateContent xmlns:mc="http://schemas.openxmlformats.org/markup-compatibility/2006" xmlns:p14="http://schemas.microsoft.com/office/powerpoint/2010/main">
-    <mc:Choice Requires="p14">
+  <mc:AlternateContent xmlns:mc="http://schemas.openxmlformats.org/markup-compatibility/2006">
+    <mc:Choice xmlns:p14="http://schemas.microsoft.com/office/powerpoint/2010/main" Requires="p14">
       <p:transition p14:dur="0"/>
     </mc:Choice>
-    <mc:Fallback xmlns="">
+    <mc:Fallback>
       <p:transition/>
     </mc:Fallback>
   </mc:AlternateContent>
@@ -15847,11 +15765,11 @@
   <p:clrMapOvr>
     <a:masterClrMapping/>
   </p:clrMapOvr>
-  <mc:AlternateContent xmlns:mc="http://schemas.openxmlformats.org/markup-compatibility/2006" xmlns:p14="http://schemas.microsoft.com/office/powerpoint/2010/main">
-    <mc:Choice Requires="p14">
+  <mc:AlternateContent xmlns:mc="http://schemas.openxmlformats.org/markup-compatibility/2006">
+    <mc:Choice xmlns:p14="http://schemas.microsoft.com/office/powerpoint/2010/main" Requires="p14">
       <p:transition p14:dur="0"/>
     </mc:Choice>
-    <mc:Fallback xmlns="">
+    <mc:Fallback>
       <p:transition/>
     </mc:Fallback>
   </mc:AlternateContent>
@@ -16144,16 +16062,12 @@
   <p:clrMapOvr>
     <a:masterClrMapping/>
   </p:clrMapOvr>
-  <mc:AlternateContent xmlns:mc="http://schemas.openxmlformats.org/markup-compatibility/2006" xmlns:p14="http://schemas.microsoft.com/office/powerpoint/2010/main">
-    <mc:Choice Requires="p14">
-      <p:transition spd="med" p14:dur="700">
-        <p:fade/>
-      </p:transition>
+  <mc:AlternateContent xmlns:mc="http://schemas.openxmlformats.org/markup-compatibility/2006">
+    <mc:Choice xmlns:p14="http://schemas.microsoft.com/office/powerpoint/2010/main" Requires="p14">
+      <p:transition p14:dur="0"/>
     </mc:Choice>
-    <mc:Fallback xmlns="">
-      <p:transition spd="med">
-        <p:fade/>
-      </p:transition>
+    <mc:Fallback>
+      <p:transition/>
     </mc:Fallback>
   </mc:AlternateContent>
 </p:sldLayout>
@@ -16573,16 +16487,12 @@
   <p:clrMapOvr>
     <a:masterClrMapping/>
   </p:clrMapOvr>
-  <mc:AlternateContent xmlns:mc="http://schemas.openxmlformats.org/markup-compatibility/2006" xmlns:p14="http://schemas.microsoft.com/office/powerpoint/2010/main">
-    <mc:Choice Requires="p14">
-      <p:transition spd="med" p14:dur="700">
-        <p:fade/>
-      </p:transition>
+  <mc:AlternateContent xmlns:mc="http://schemas.openxmlformats.org/markup-compatibility/2006">
+    <mc:Choice xmlns:p14="http://schemas.microsoft.com/office/powerpoint/2010/main" Requires="p14">
+      <p:transition p14:dur="0"/>
     </mc:Choice>
-    <mc:Fallback xmlns="">
-      <p:transition spd="med">
-        <p:fade/>
-      </p:transition>
+    <mc:Fallback>
+      <p:transition/>
     </mc:Fallback>
   </mc:AlternateContent>
 </p:sldLayout>
@@ -16741,12 +16651,12 @@
   <p:clrMapOvr>
     <a:masterClrMapping/>
   </p:clrMapOvr>
-  <mc:AlternateContent xmlns:mc="http://schemas.openxmlformats.org/markup-compatibility/2006" xmlns:p14="http://schemas.microsoft.com/office/powerpoint/2010/main">
-    <mc:Choice Requires="p14">
-      <p:transition p14:dur="0" advTm="3000"/>
+  <mc:AlternateContent xmlns:mc="http://schemas.openxmlformats.org/markup-compatibility/2006">
+    <mc:Choice xmlns:p14="http://schemas.microsoft.com/office/powerpoint/2010/main" Requires="p14">
+      <p:transition p14:dur="0"/>
     </mc:Choice>
-    <mc:Fallback xmlns="">
-      <p:transition advTm="3000"/>
+    <mc:Fallback>
+      <p:transition/>
     </mc:Fallback>
   </mc:AlternateContent>
 </p:sldLayout>
@@ -18826,16 +18736,12 @@
   <p:clrMapOvr>
     <a:masterClrMapping/>
   </p:clrMapOvr>
-  <mc:AlternateContent xmlns:mc="http://schemas.openxmlformats.org/markup-compatibility/2006" xmlns:p14="http://schemas.microsoft.com/office/powerpoint/2010/main">
-    <mc:Choice Requires="p14">
-      <p:transition spd="med" p14:dur="700">
-        <p:fade/>
-      </p:transition>
+  <mc:AlternateContent xmlns:mc="http://schemas.openxmlformats.org/markup-compatibility/2006">
+    <mc:Choice xmlns:p14="http://schemas.microsoft.com/office/powerpoint/2010/main" Requires="p14">
+      <p:transition p14:dur="0"/>
     </mc:Choice>
-    <mc:Fallback xmlns="">
-      <p:transition spd="med">
-        <p:fade/>
-      </p:transition>
+    <mc:Fallback>
+      <p:transition/>
     </mc:Fallback>
   </mc:AlternateContent>
 </p:sldLayout>
@@ -21151,16 +21057,12 @@
   <p:clrMapOvr>
     <a:masterClrMapping/>
   </p:clrMapOvr>
-  <mc:AlternateContent xmlns:mc="http://schemas.openxmlformats.org/markup-compatibility/2006" xmlns:p14="http://schemas.microsoft.com/office/powerpoint/2010/main">
-    <mc:Choice Requires="p14">
-      <p:transition spd="med" p14:dur="700">
-        <p:fade/>
-      </p:transition>
+  <mc:AlternateContent xmlns:mc="http://schemas.openxmlformats.org/markup-compatibility/2006">
+    <mc:Choice xmlns:p14="http://schemas.microsoft.com/office/powerpoint/2010/main" Requires="p14">
+      <p:transition p14:dur="0"/>
     </mc:Choice>
-    <mc:Fallback xmlns="">
-      <p:transition spd="med">
-        <p:fade/>
-      </p:transition>
+    <mc:Fallback>
+      <p:transition/>
     </mc:Fallback>
   </mc:AlternateContent>
 </p:sldLayout>
@@ -21804,16 +21706,12 @@
     <p:sldLayoutId id="2147483694" r:id="rId6"/>
     <p:sldLayoutId id="2147483738" r:id="rId7"/>
   </p:sldLayoutIdLst>
-  <mc:AlternateContent xmlns:mc="http://schemas.openxmlformats.org/markup-compatibility/2006" xmlns:p14="http://schemas.microsoft.com/office/powerpoint/2010/main">
-    <mc:Choice Requires="p14">
-      <p:transition spd="med" p14:dur="700">
-        <p:fade/>
-      </p:transition>
+  <mc:AlternateContent xmlns:mc="http://schemas.openxmlformats.org/markup-compatibility/2006">
+    <mc:Choice xmlns:p14="http://schemas.microsoft.com/office/powerpoint/2010/main" Requires="p14">
+      <p:transition p14:dur="0"/>
     </mc:Choice>
-    <mc:Fallback xmlns="">
-      <p:transition spd="med">
-        <p:fade/>
-      </p:transition>
+    <mc:Fallback>
+      <p:transition/>
     </mc:Fallback>
   </mc:AlternateContent>
   <p:hf hdr="0" dt="0"/>
@@ -24658,16 +24556,12 @@
     <p:sldLayoutId id="2147483706" r:id="rId8"/>
     <p:sldLayoutId id="2147483707" r:id="rId9"/>
   </p:sldLayoutIdLst>
-  <mc:AlternateContent xmlns:mc="http://schemas.openxmlformats.org/markup-compatibility/2006" xmlns:p14="http://schemas.microsoft.com/office/powerpoint/2010/main">
-    <mc:Choice Requires="p14">
-      <p:transition spd="med" p14:dur="700">
-        <p:fade/>
-      </p:transition>
+  <mc:AlternateContent xmlns:mc="http://schemas.openxmlformats.org/markup-compatibility/2006">
+    <mc:Choice xmlns:p14="http://schemas.microsoft.com/office/powerpoint/2010/main" Requires="p14">
+      <p:transition p14:dur="0"/>
     </mc:Choice>
-    <mc:Fallback xmlns="">
-      <p:transition spd="med">
-        <p:fade/>
-      </p:transition>
+    <mc:Fallback>
+      <p:transition/>
     </mc:Fallback>
   </mc:AlternateContent>
   <p:hf hdr="0" dt="0"/>
@@ -25741,16 +25635,12 @@
     <p:sldLayoutId id="2147483721" r:id="rId9"/>
     <p:sldLayoutId id="2147483722" r:id="rId10"/>
   </p:sldLayoutIdLst>
-  <mc:AlternateContent xmlns:mc="http://schemas.openxmlformats.org/markup-compatibility/2006" xmlns:p14="http://schemas.microsoft.com/office/powerpoint/2010/main">
-    <mc:Choice Requires="p14">
-      <p:transition spd="med" p14:dur="700">
-        <p:fade/>
-      </p:transition>
+  <mc:AlternateContent xmlns:mc="http://schemas.openxmlformats.org/markup-compatibility/2006">
+    <mc:Choice xmlns:p14="http://schemas.microsoft.com/office/powerpoint/2010/main" Requires="p14">
+      <p:transition p14:dur="0"/>
     </mc:Choice>
-    <mc:Fallback xmlns="">
-      <p:transition spd="med">
-        <p:fade/>
-      </p:transition>
+    <mc:Fallback>
+      <p:transition/>
     </mc:Fallback>
   </mc:AlternateContent>
   <p:hf hdr="0" dt="0"/>
@@ -26825,16 +26715,12 @@
     <p:sldLayoutId id="2147483735" r:id="rId10"/>
     <p:sldLayoutId id="2147483737" r:id="rId11"/>
   </p:sldLayoutIdLst>
-  <mc:AlternateContent xmlns:mc="http://schemas.openxmlformats.org/markup-compatibility/2006" xmlns:p14="http://schemas.microsoft.com/office/powerpoint/2010/main">
-    <mc:Choice Requires="p14">
-      <p:transition spd="med" p14:dur="700">
-        <p:fade/>
-      </p:transition>
+  <mc:AlternateContent xmlns:mc="http://schemas.openxmlformats.org/markup-compatibility/2006">
+    <mc:Choice xmlns:p14="http://schemas.microsoft.com/office/powerpoint/2010/main" Requires="p14">
+      <p:transition p14:dur="0"/>
     </mc:Choice>
-    <mc:Fallback xmlns="">
-      <p:transition spd="med">
-        <p:fade/>
-      </p:transition>
+    <mc:Fallback>
+      <p:transition/>
     </mc:Fallback>
   </mc:AlternateContent>
   <p:hf hdr="0" dt="0"/>
@@ -27616,6 +27502,14 @@
     <p:sldLayoutId id="2147483740" r:id="rId1"/>
     <p:sldLayoutId id="2147483741" r:id="rId2"/>
   </p:sldLayoutIdLst>
+  <mc:AlternateContent xmlns:mc="http://schemas.openxmlformats.org/markup-compatibility/2006">
+    <mc:Choice xmlns:p14="http://schemas.microsoft.com/office/powerpoint/2010/main" Requires="p14">
+      <p:transition p14:dur="0"/>
+    </mc:Choice>
+    <mc:Fallback>
+      <p:transition/>
+    </mc:Fallback>
+  </mc:AlternateContent>
   <p:hf sldNum="0" hdr="0" dt="0"/>
   <p:txStyles>
     <p:titleStyle>
@@ -28295,11 +28189,11 @@
     <p:sldLayoutId id="2147483751" r:id="rId8"/>
     <p:sldLayoutId id="2147483752" r:id="rId9"/>
   </p:sldLayoutIdLst>
-  <mc:AlternateContent xmlns:mc="http://schemas.openxmlformats.org/markup-compatibility/2006" xmlns:p14="http://schemas.microsoft.com/office/powerpoint/2010/main">
-    <mc:Choice Requires="p14">
+  <mc:AlternateContent xmlns:mc="http://schemas.openxmlformats.org/markup-compatibility/2006">
+    <mc:Choice xmlns:p14="http://schemas.microsoft.com/office/powerpoint/2010/main" Requires="p14">
       <p:transition p14:dur="0"/>
     </mc:Choice>
-    <mc:Fallback xmlns="">
+    <mc:Fallback>
       <p:transition/>
     </mc:Fallback>
   </mc:AlternateContent>
@@ -28971,16 +28865,12 @@
   <p:clrMapOvr>
     <a:masterClrMapping/>
   </p:clrMapOvr>
-  <mc:AlternateContent xmlns:mc="http://schemas.openxmlformats.org/markup-compatibility/2006" xmlns:p14="http://schemas.microsoft.com/office/powerpoint/2010/main">
-    <mc:Choice Requires="p14">
-      <p:transition spd="med" p14:dur="700">
-        <p:fade/>
-      </p:transition>
+  <mc:AlternateContent xmlns:mc="http://schemas.openxmlformats.org/markup-compatibility/2006">
+    <mc:Choice xmlns:p14="http://schemas.microsoft.com/office/powerpoint/2010/main" Requires="p14">
+      <p:transition p14:dur="0"/>
     </mc:Choice>
-    <mc:Fallback xmlns="">
-      <p:transition spd="med">
-        <p:fade/>
-      </p:transition>
+    <mc:Fallback>
+      <p:transition/>
     </mc:Fallback>
   </mc:AlternateContent>
   <p:timing>
@@ -31307,6 +31197,14 @@
   <p:clrMapOvr>
     <a:masterClrMapping/>
   </p:clrMapOvr>
+  <mc:AlternateContent xmlns:mc="http://schemas.openxmlformats.org/markup-compatibility/2006">
+    <mc:Choice xmlns:p14="http://schemas.microsoft.com/office/powerpoint/2010/main" Requires="p14">
+      <p:transition p14:dur="0"/>
+    </mc:Choice>
+    <mc:Fallback>
+      <p:transition/>
+    </mc:Fallback>
+  </mc:AlternateContent>
   <p:timing>
     <p:tnLst>
       <p:par>
@@ -31527,16 +31425,12 @@
   <p:clrMapOvr>
     <a:masterClrMapping/>
   </p:clrMapOvr>
-  <mc:AlternateContent xmlns:mc="http://schemas.openxmlformats.org/markup-compatibility/2006" xmlns:p14="http://schemas.microsoft.com/office/powerpoint/2010/main">
-    <mc:Choice Requires="p14">
-      <p:transition spd="med" p14:dur="700">
-        <p:fade/>
-      </p:transition>
+  <mc:AlternateContent xmlns:mc="http://schemas.openxmlformats.org/markup-compatibility/2006">
+    <mc:Choice xmlns:p14="http://schemas.microsoft.com/office/powerpoint/2010/main" Requires="p14">
+      <p:transition p14:dur="0"/>
     </mc:Choice>
-    <mc:Fallback xmlns="">
-      <p:transition spd="med">
-        <p:fade/>
-      </p:transition>
+    <mc:Fallback>
+      <p:transition/>
     </mc:Fallback>
   </mc:AlternateContent>
   <p:timing>
@@ -34526,6 +34420,14 @@
   <p:clrMapOvr>
     <a:masterClrMapping/>
   </p:clrMapOvr>
+  <mc:AlternateContent xmlns:mc="http://schemas.openxmlformats.org/markup-compatibility/2006">
+    <mc:Choice xmlns:p14="http://schemas.microsoft.com/office/powerpoint/2010/main" Requires="p14">
+      <p:transition p14:dur="0"/>
+    </mc:Choice>
+    <mc:Fallback>
+      <p:transition/>
+    </mc:Fallback>
+  </mc:AlternateContent>
   <p:timing>
     <p:tnLst>
       <p:par>
@@ -34775,16 +34677,12 @@
   <p:clrMapOvr>
     <a:masterClrMapping/>
   </p:clrMapOvr>
-  <mc:AlternateContent xmlns:mc="http://schemas.openxmlformats.org/markup-compatibility/2006" xmlns:p14="http://schemas.microsoft.com/office/powerpoint/2010/main">
-    <mc:Choice Requires="p14">
-      <p:transition spd="med" p14:dur="700">
-        <p:fade/>
-      </p:transition>
+  <mc:AlternateContent xmlns:mc="http://schemas.openxmlformats.org/markup-compatibility/2006">
+    <mc:Choice xmlns:p14="http://schemas.microsoft.com/office/powerpoint/2010/main" Requires="p14">
+      <p:transition p14:dur="0"/>
     </mc:Choice>
-    <mc:Fallback xmlns="">
-      <p:transition spd="med">
-        <p:fade/>
-      </p:transition>
+    <mc:Fallback>
+      <p:transition/>
     </mc:Fallback>
   </mc:AlternateContent>
   <p:timing>
@@ -34955,12 +34853,12 @@
   <p:clrMapOvr>
     <a:masterClrMapping/>
   </p:clrMapOvr>
-  <mc:AlternateContent xmlns:mc="http://schemas.openxmlformats.org/markup-compatibility/2006" xmlns:p14="http://schemas.microsoft.com/office/powerpoint/2010/main">
-    <mc:Choice Requires="p14">
-      <p:transition p14:dur="0" advTm="3000"/>
+  <mc:AlternateContent xmlns:mc="http://schemas.openxmlformats.org/markup-compatibility/2006">
+    <mc:Choice xmlns:p14="http://schemas.microsoft.com/office/powerpoint/2010/main" Requires="p14">
+      <p:transition p14:dur="0"/>
     </mc:Choice>
-    <mc:Fallback xmlns="">
-      <p:transition advTm="3000"/>
+    <mc:Fallback>
+      <p:transition/>
     </mc:Fallback>
   </mc:AlternateContent>
   <p:timing>
@@ -35116,12 +35014,12 @@
   <p:clrMapOvr>
     <a:masterClrMapping/>
   </p:clrMapOvr>
-  <mc:AlternateContent xmlns:mc="http://schemas.openxmlformats.org/markup-compatibility/2006" xmlns:p14="http://schemas.microsoft.com/office/powerpoint/2010/main">
-    <mc:Choice Requires="p14">
-      <p:transition p14:dur="0" advTm="3000"/>
+  <mc:AlternateContent xmlns:mc="http://schemas.openxmlformats.org/markup-compatibility/2006">
+    <mc:Choice xmlns:p14="http://schemas.microsoft.com/office/powerpoint/2010/main" Requires="p14">
+      <p:transition p14:dur="0"/>
     </mc:Choice>
-    <mc:Fallback xmlns="">
-      <p:transition advTm="3000"/>
+    <mc:Fallback>
+      <p:transition/>
     </mc:Fallback>
   </mc:AlternateContent>
   <p:timing>
@@ -35304,16 +35202,12 @@
   <p:clrMapOvr>
     <a:masterClrMapping/>
   </p:clrMapOvr>
-  <mc:AlternateContent xmlns:mc="http://schemas.openxmlformats.org/markup-compatibility/2006" xmlns:p14="http://schemas.microsoft.com/office/powerpoint/2010/main">
-    <mc:Choice Requires="p14">
-      <p:transition spd="med" p14:dur="700">
-        <p:fade/>
-      </p:transition>
+  <mc:AlternateContent xmlns:mc="http://schemas.openxmlformats.org/markup-compatibility/2006">
+    <mc:Choice xmlns:p14="http://schemas.microsoft.com/office/powerpoint/2010/main" Requires="p14">
+      <p:transition p14:dur="0"/>
     </mc:Choice>
-    <mc:Fallback xmlns="">
-      <p:transition spd="med">
-        <p:fade/>
-      </p:transition>
+    <mc:Fallback>
+      <p:transition/>
     </mc:Fallback>
   </mc:AlternateContent>
   <p:timing>
@@ -35496,12 +35390,12 @@
   <p:clrMapOvr>
     <a:masterClrMapping/>
   </p:clrMapOvr>
-  <mc:AlternateContent xmlns:mc="http://schemas.openxmlformats.org/markup-compatibility/2006" xmlns:p14="http://schemas.microsoft.com/office/powerpoint/2010/main">
-    <mc:Choice Requires="p14">
-      <p:transition p14:dur="0" advTm="3000"/>
+  <mc:AlternateContent xmlns:mc="http://schemas.openxmlformats.org/markup-compatibility/2006">
+    <mc:Choice xmlns:p14="http://schemas.microsoft.com/office/powerpoint/2010/main" Requires="p14">
+      <p:transition p14:dur="0"/>
     </mc:Choice>
-    <mc:Fallback xmlns="">
-      <p:transition advTm="3000"/>
+    <mc:Fallback>
+      <p:transition/>
     </mc:Fallback>
   </mc:AlternateContent>
   <p:timing>
@@ -35715,16 +35609,12 @@
   <p:clrMapOvr>
     <a:masterClrMapping/>
   </p:clrMapOvr>
-  <mc:AlternateContent xmlns:mc="http://schemas.openxmlformats.org/markup-compatibility/2006" xmlns:p14="http://schemas.microsoft.com/office/powerpoint/2010/main">
-    <mc:Choice Requires="p14">
-      <p:transition spd="med" p14:dur="700">
-        <p:fade/>
-      </p:transition>
+  <mc:AlternateContent xmlns:mc="http://schemas.openxmlformats.org/markup-compatibility/2006">
+    <mc:Choice xmlns:p14="http://schemas.microsoft.com/office/powerpoint/2010/main" Requires="p14">
+      <p:transition p14:dur="0"/>
     </mc:Choice>
-    <mc:Fallback xmlns="">
-      <p:transition spd="med">
-        <p:fade/>
-      </p:transition>
+    <mc:Fallback>
+      <p:transition/>
     </mc:Fallback>
   </mc:AlternateContent>
   <p:timing>
@@ -35993,16 +35883,12 @@
   <p:clrMapOvr>
     <a:masterClrMapping/>
   </p:clrMapOvr>
-  <mc:AlternateContent xmlns:mc="http://schemas.openxmlformats.org/markup-compatibility/2006" xmlns:p14="http://schemas.microsoft.com/office/powerpoint/2010/main">
-    <mc:Choice Requires="p14">
-      <p:transition spd="med" p14:dur="700">
-        <p:fade/>
-      </p:transition>
+  <mc:AlternateContent xmlns:mc="http://schemas.openxmlformats.org/markup-compatibility/2006">
+    <mc:Choice xmlns:p14="http://schemas.microsoft.com/office/powerpoint/2010/main" Requires="p14">
+      <p:transition p14:dur="0"/>
     </mc:Choice>
-    <mc:Fallback xmlns="">
-      <p:transition spd="med">
-        <p:fade/>
-      </p:transition>
+    <mc:Fallback>
+      <p:transition/>
     </mc:Fallback>
   </mc:AlternateContent>
   <p:timing>
@@ -36139,12 +36025,12 @@
   <p:clrMapOvr>
     <a:masterClrMapping/>
   </p:clrMapOvr>
-  <mc:AlternateContent xmlns:mc="http://schemas.openxmlformats.org/markup-compatibility/2006" xmlns:p14="http://schemas.microsoft.com/office/powerpoint/2010/main">
-    <mc:Choice Requires="p14">
-      <p:transition p14:dur="0" advTm="3000"/>
+  <mc:AlternateContent xmlns:mc="http://schemas.openxmlformats.org/markup-compatibility/2006">
+    <mc:Choice xmlns:p14="http://schemas.microsoft.com/office/powerpoint/2010/main" Requires="p14">
+      <p:transition p14:dur="0"/>
     </mc:Choice>
-    <mc:Fallback xmlns="">
-      <p:transition advTm="3000"/>
+    <mc:Fallback>
+      <p:transition/>
     </mc:Fallback>
   </mc:AlternateContent>
   <p:timing>
@@ -36354,16 +36240,12 @@
   <p:clrMapOvr>
     <a:masterClrMapping/>
   </p:clrMapOvr>
-  <mc:AlternateContent xmlns:mc="http://schemas.openxmlformats.org/markup-compatibility/2006" xmlns:p14="http://schemas.microsoft.com/office/powerpoint/2010/main">
-    <mc:Choice Requires="p14">
-      <p:transition spd="med" p14:dur="700">
-        <p:fade/>
-      </p:transition>
+  <mc:AlternateContent xmlns:mc="http://schemas.openxmlformats.org/markup-compatibility/2006">
+    <mc:Choice xmlns:p14="http://schemas.microsoft.com/office/powerpoint/2010/main" Requires="p14">
+      <p:transition p14:dur="0"/>
     </mc:Choice>
-    <mc:Fallback xmlns="">
-      <p:transition spd="med">
-        <p:fade/>
-      </p:transition>
+    <mc:Fallback>
+      <p:transition/>
     </mc:Fallback>
   </mc:AlternateContent>
   <p:timing>
@@ -36555,16 +36437,12 @@
   <p:clrMapOvr>
     <a:masterClrMapping/>
   </p:clrMapOvr>
-  <mc:AlternateContent xmlns:mc="http://schemas.openxmlformats.org/markup-compatibility/2006" xmlns:p14="http://schemas.microsoft.com/office/powerpoint/2010/main">
-    <mc:Choice Requires="p14">
-      <p:transition spd="med" p14:dur="700">
-        <p:fade/>
-      </p:transition>
+  <mc:AlternateContent xmlns:mc="http://schemas.openxmlformats.org/markup-compatibility/2006">
+    <mc:Choice xmlns:p14="http://schemas.microsoft.com/office/powerpoint/2010/main" Requires="p14">
+      <p:transition p14:dur="0"/>
     </mc:Choice>
-    <mc:Fallback xmlns="">
-      <p:transition spd="med">
-        <p:fade/>
-      </p:transition>
+    <mc:Fallback>
+      <p:transition/>
     </mc:Fallback>
   </mc:AlternateContent>
   <p:timing>
@@ -36776,12 +36654,12 @@
   <p:clrMapOvr>
     <a:masterClrMapping/>
   </p:clrMapOvr>
-  <mc:AlternateContent xmlns:mc="http://schemas.openxmlformats.org/markup-compatibility/2006" xmlns:p14="http://schemas.microsoft.com/office/powerpoint/2010/main">
-    <mc:Choice Requires="p14">
-      <p:transition p14:dur="0" advTm="3000"/>
+  <mc:AlternateContent xmlns:mc="http://schemas.openxmlformats.org/markup-compatibility/2006">
+    <mc:Choice xmlns:p14="http://schemas.microsoft.com/office/powerpoint/2010/main" Requires="p14">
+      <p:transition p14:dur="0"/>
     </mc:Choice>
-    <mc:Fallback xmlns="">
-      <p:transition advTm="3000"/>
+    <mc:Fallback>
+      <p:transition/>
     </mc:Fallback>
   </mc:AlternateContent>
   <p:timing>
@@ -36921,16 +36799,12 @@
   <p:clrMapOvr>
     <a:masterClrMapping/>
   </p:clrMapOvr>
-  <mc:AlternateContent xmlns:mc="http://schemas.openxmlformats.org/markup-compatibility/2006" xmlns:p14="http://schemas.microsoft.com/office/powerpoint/2010/main">
-    <mc:Choice Requires="p14">
-      <p:transition spd="med" p14:dur="700">
-        <p:fade/>
-      </p:transition>
+  <mc:AlternateContent xmlns:mc="http://schemas.openxmlformats.org/markup-compatibility/2006">
+    <mc:Choice xmlns:p14="http://schemas.microsoft.com/office/powerpoint/2010/main" Requires="p14">
+      <p:transition p14:dur="0"/>
     </mc:Choice>
-    <mc:Fallback xmlns="">
-      <p:transition spd="med">
-        <p:fade/>
-      </p:transition>
+    <mc:Fallback>
+      <p:transition/>
     </mc:Fallback>
   </mc:AlternateContent>
   <p:timing>
@@ -37692,16 +37566,12 @@
   <p:clrMapOvr>
     <a:masterClrMapping/>
   </p:clrMapOvr>
-  <mc:AlternateContent xmlns:mc="http://schemas.openxmlformats.org/markup-compatibility/2006" xmlns:p14="http://schemas.microsoft.com/office/powerpoint/2010/main">
-    <mc:Choice Requires="p14">
-      <p:transition spd="med" p14:dur="700">
-        <p:fade/>
-      </p:transition>
+  <mc:AlternateContent xmlns:mc="http://schemas.openxmlformats.org/markup-compatibility/2006">
+    <mc:Choice xmlns:p14="http://schemas.microsoft.com/office/powerpoint/2010/main" Requires="p14">
+      <p:transition p14:dur="0"/>
     </mc:Choice>
-    <mc:Fallback xmlns="">
-      <p:transition spd="med">
-        <p:fade/>
-      </p:transition>
+    <mc:Fallback>
+      <p:transition/>
     </mc:Fallback>
   </mc:AlternateContent>
   <p:timing>
@@ -37916,16 +37786,12 @@
   <p:clrMapOvr>
     <a:masterClrMapping/>
   </p:clrMapOvr>
-  <mc:AlternateContent xmlns:mc="http://schemas.openxmlformats.org/markup-compatibility/2006" xmlns:p14="http://schemas.microsoft.com/office/powerpoint/2010/main">
-    <mc:Choice Requires="p14">
-      <p:transition spd="med" p14:dur="700">
-        <p:fade/>
-      </p:transition>
+  <mc:AlternateContent xmlns:mc="http://schemas.openxmlformats.org/markup-compatibility/2006">
+    <mc:Choice xmlns:p14="http://schemas.microsoft.com/office/powerpoint/2010/main" Requires="p14">
+      <p:transition p14:dur="0"/>
     </mc:Choice>
-    <mc:Fallback xmlns="">
-      <p:transition spd="med">
-        <p:fade/>
-      </p:transition>
+    <mc:Fallback>
+      <p:transition/>
     </mc:Fallback>
   </mc:AlternateContent>
   <p:timing>
@@ -38048,12 +37914,12 @@
   <p:clrMapOvr>
     <a:masterClrMapping/>
   </p:clrMapOvr>
-  <mc:AlternateContent xmlns:mc="http://schemas.openxmlformats.org/markup-compatibility/2006" xmlns:p14="http://schemas.microsoft.com/office/powerpoint/2010/main">
-    <mc:Choice Requires="p14">
-      <p:transition p14:dur="0" advTm="3000"/>
+  <mc:AlternateContent xmlns:mc="http://schemas.openxmlformats.org/markup-compatibility/2006">
+    <mc:Choice xmlns:p14="http://schemas.microsoft.com/office/powerpoint/2010/main" Requires="p14">
+      <p:transition p14:dur="0"/>
     </mc:Choice>
-    <mc:Fallback xmlns="">
-      <p:transition advTm="3000"/>
+    <mc:Fallback>
+      <p:transition/>
     </mc:Fallback>
   </mc:AlternateContent>
   <p:timing>
@@ -38244,12 +38110,12 @@
   <p:clrMapOvr>
     <a:masterClrMapping/>
   </p:clrMapOvr>
-  <mc:AlternateContent xmlns:mc="http://schemas.openxmlformats.org/markup-compatibility/2006" xmlns:p14="http://schemas.microsoft.com/office/powerpoint/2010/main">
-    <mc:Choice Requires="p14">
-      <p:transition p14:dur="0" advTm="3000"/>
+  <mc:AlternateContent xmlns:mc="http://schemas.openxmlformats.org/markup-compatibility/2006">
+    <mc:Choice xmlns:p14="http://schemas.microsoft.com/office/powerpoint/2010/main" Requires="p14">
+      <p:transition p14:dur="0"/>
     </mc:Choice>
-    <mc:Fallback xmlns="">
-      <p:transition advTm="3000"/>
+    <mc:Fallback>
+      <p:transition/>
     </mc:Fallback>
   </mc:AlternateContent>
   <p:timing>
@@ -38365,12 +38231,12 @@
   <p:clrMapOvr>
     <a:masterClrMapping/>
   </p:clrMapOvr>
-  <mc:AlternateContent xmlns:mc="http://schemas.openxmlformats.org/markup-compatibility/2006" xmlns:p14="http://schemas.microsoft.com/office/powerpoint/2010/main">
-    <mc:Choice Requires="p14">
-      <p:transition p14:dur="0" advTm="3000"/>
+  <mc:AlternateContent xmlns:mc="http://schemas.openxmlformats.org/markup-compatibility/2006">
+    <mc:Choice xmlns:p14="http://schemas.microsoft.com/office/powerpoint/2010/main" Requires="p14">
+      <p:transition p14:dur="0"/>
     </mc:Choice>
-    <mc:Fallback xmlns="">
-      <p:transition advTm="3000"/>
+    <mc:Fallback>
+      <p:transition/>
     </mc:Fallback>
   </mc:AlternateContent>
 </p:sld>
@@ -38546,12 +38412,12 @@
   <p:clrMapOvr>
     <a:masterClrMapping/>
   </p:clrMapOvr>
-  <mc:AlternateContent xmlns:mc="http://schemas.openxmlformats.org/markup-compatibility/2006" xmlns:p14="http://schemas.microsoft.com/office/powerpoint/2010/main">
-    <mc:Choice Requires="p14">
-      <p:transition p14:dur="0" advTm="3000"/>
+  <mc:AlternateContent xmlns:mc="http://schemas.openxmlformats.org/markup-compatibility/2006">
+    <mc:Choice xmlns:p14="http://schemas.microsoft.com/office/powerpoint/2010/main" Requires="p14">
+      <p:transition p14:dur="0"/>
     </mc:Choice>
-    <mc:Fallback xmlns="">
-      <p:transition advTm="3000"/>
+    <mc:Fallback>
+      <p:transition/>
     </mc:Fallback>
   </mc:AlternateContent>
   <p:timing>
@@ -38770,16 +38636,12 @@
   <p:clrMapOvr>
     <a:masterClrMapping/>
   </p:clrMapOvr>
-  <mc:AlternateContent xmlns:mc="http://schemas.openxmlformats.org/markup-compatibility/2006" xmlns:p14="http://schemas.microsoft.com/office/powerpoint/2010/main">
-    <mc:Choice Requires="p14">
-      <p:transition spd="med" p14:dur="700">
-        <p:fade/>
-      </p:transition>
+  <mc:AlternateContent xmlns:mc="http://schemas.openxmlformats.org/markup-compatibility/2006">
+    <mc:Choice xmlns:p14="http://schemas.microsoft.com/office/powerpoint/2010/main" Requires="p14">
+      <p:transition p14:dur="0"/>
     </mc:Choice>
-    <mc:Fallback xmlns="">
-      <p:transition spd="med">
-        <p:fade/>
-      </p:transition>
+    <mc:Fallback>
+      <p:transition/>
     </mc:Fallback>
   </mc:AlternateContent>
   <p:timing>
@@ -41598,9 +41460,12 @@
 </file>
 
 <file path=customXml/item1.xml><?xml version="1.0" encoding="utf-8"?>
-<p:properties xmlns:p="http://schemas.microsoft.com/office/2006/metadata/properties" xmlns:xsi="http://www.w3.org/2001/XMLSchema-instance" xmlns:pc="http://schemas.microsoft.com/office/infopath/2007/PartnerControls">
-  <documentManagement/>
-</p:properties>
+<?mso-contentType ?>
+<FormTemplates xmlns="http://schemas.microsoft.com/sharepoint/v3/contenttype/forms">
+  <Display>DocumentLibraryForm</Display>
+  <Edit>DocumentLibraryForm</Edit>
+  <New>DocumentLibraryForm</New>
+</FormTemplates>
 </file>
 
 <file path=customXml/item2.xml><?xml version="1.0" encoding="utf-8"?>
@@ -41718,25 +41583,15 @@
 </file>
 
 <file path=customXml/item3.xml><?xml version="1.0" encoding="utf-8"?>
-<?mso-contentType ?>
-<FormTemplates xmlns="http://schemas.microsoft.com/sharepoint/v3/contenttype/forms">
-  <Display>DocumentLibraryForm</Display>
-  <Edit>DocumentLibraryForm</Edit>
-  <New>DocumentLibraryForm</New>
-</FormTemplates>
+<p:properties xmlns:p="http://schemas.microsoft.com/office/2006/metadata/properties" xmlns:xsi="http://www.w3.org/2001/XMLSchema-instance" xmlns:pc="http://schemas.microsoft.com/office/infopath/2007/PartnerControls">
+  <documentManagement/>
+</p:properties>
 </file>
 
 <file path=customXml/itemProps1.xml><?xml version="1.0" encoding="utf-8"?>
-<ds:datastoreItem xmlns:ds="http://schemas.openxmlformats.org/officeDocument/2006/customXml" ds:itemID="{81CC6956-33F6-4FE5-A8DC-5120FA44C6E2}">
+<ds:datastoreItem xmlns:ds="http://schemas.openxmlformats.org/officeDocument/2006/customXml" ds:itemID="{2C7B8F7B-FA54-4029-85C6-874BDE49F8B7}">
   <ds:schemaRefs>
-    <ds:schemaRef ds:uri="http://schemas.microsoft.com/office/2006/metadata/properties"/>
-    <ds:schemaRef ds:uri="http://purl.org/dc/terms/"/>
-    <ds:schemaRef ds:uri="http://schemas.openxmlformats.org/package/2006/metadata/core-properties"/>
-    <ds:schemaRef ds:uri="http://schemas.microsoft.com/office/2006/documentManagement/types"/>
-    <ds:schemaRef ds:uri="http://schemas.microsoft.com/office/infopath/2007/PartnerControls"/>
-    <ds:schemaRef ds:uri="http://purl.org/dc/elements/1.1/"/>
-    <ds:schemaRef ds:uri="http://www.w3.org/XML/1998/namespace"/>
-    <ds:schemaRef ds:uri="http://purl.org/dc/dcmitype/"/>
+    <ds:schemaRef ds:uri="http://schemas.microsoft.com/sharepoint/v3/contenttype/forms"/>
   </ds:schemaRefs>
 </ds:datastoreItem>
 </file>
@@ -41758,9 +41613,16 @@
 </file>
 
 <file path=customXml/itemProps3.xml><?xml version="1.0" encoding="utf-8"?>
-<ds:datastoreItem xmlns:ds="http://schemas.openxmlformats.org/officeDocument/2006/customXml" ds:itemID="{2C7B8F7B-FA54-4029-85C6-874BDE49F8B7}">
+<ds:datastoreItem xmlns:ds="http://schemas.openxmlformats.org/officeDocument/2006/customXml" ds:itemID="{81CC6956-33F6-4FE5-A8DC-5120FA44C6E2}">
   <ds:schemaRefs>
-    <ds:schemaRef ds:uri="http://schemas.microsoft.com/sharepoint/v3/contenttype/forms"/>
+    <ds:schemaRef ds:uri="http://schemas.microsoft.com/office/2006/metadata/properties"/>
+    <ds:schemaRef ds:uri="http://purl.org/dc/terms/"/>
+    <ds:schemaRef ds:uri="http://schemas.openxmlformats.org/package/2006/metadata/core-properties"/>
+    <ds:schemaRef ds:uri="http://schemas.microsoft.com/office/2006/documentManagement/types"/>
+    <ds:schemaRef ds:uri="http://schemas.microsoft.com/office/infopath/2007/PartnerControls"/>
+    <ds:schemaRef ds:uri="http://purl.org/dc/elements/1.1/"/>
+    <ds:schemaRef ds:uri="http://www.w3.org/XML/1998/namespace"/>
+    <ds:schemaRef ds:uri="http://purl.org/dc/dcmitype/"/>
   </ds:schemaRefs>
 </ds:datastoreItem>
 </file>
</xml_diff>

<commit_message>
refinement: Update capabilities list in Disciplined Engineering presentation
Change-Id: I6431004cd9f3526b2e6f021fda87c65fd2136f59
</commit_message>
<xml_diff>
--- a/plugins/org.eclipse.osee.support.admin/presentations_publications/Disciplined_Engineering_with_OSEE.pptx
+++ b/plugins/org.eclipse.osee.support.admin/presentations_publications/Disciplined_Engineering_with_OSEE.pptx
@@ -1863,11 +1863,11 @@
   <p:clrMapOvr>
     <a:masterClrMapping/>
   </p:clrMapOvr>
-  <mc:AlternateContent xmlns:mc="http://schemas.openxmlformats.org/markup-compatibility/2006">
-    <mc:Choice xmlns:p14="http://schemas.microsoft.com/office/powerpoint/2010/main" Requires="p14">
+  <mc:AlternateContent xmlns:mc="http://schemas.openxmlformats.org/markup-compatibility/2006" xmlns:p14="http://schemas.microsoft.com/office/powerpoint/2010/main">
+    <mc:Choice Requires="p14">
       <p:transition p14:dur="0"/>
     </mc:Choice>
-    <mc:Fallback>
+    <mc:Fallback xmlns="">
       <p:transition/>
     </mc:Fallback>
   </mc:AlternateContent>
@@ -4383,11 +4383,11 @@
   <p:clrMapOvr>
     <a:masterClrMapping/>
   </p:clrMapOvr>
-  <mc:AlternateContent xmlns:mc="http://schemas.openxmlformats.org/markup-compatibility/2006">
-    <mc:Choice xmlns:p14="http://schemas.microsoft.com/office/powerpoint/2010/main" Requires="p14">
+  <mc:AlternateContent xmlns:mc="http://schemas.openxmlformats.org/markup-compatibility/2006" xmlns:p14="http://schemas.microsoft.com/office/powerpoint/2010/main">
+    <mc:Choice Requires="p14">
       <p:transition p14:dur="0"/>
     </mc:Choice>
-    <mc:Fallback>
+    <mc:Fallback xmlns="">
       <p:transition/>
     </mc:Fallback>
   </mc:AlternateContent>
@@ -4577,11 +4577,11 @@
   <p:clrMapOvr>
     <a:masterClrMapping/>
   </p:clrMapOvr>
-  <mc:AlternateContent xmlns:mc="http://schemas.openxmlformats.org/markup-compatibility/2006">
-    <mc:Choice xmlns:p14="http://schemas.microsoft.com/office/powerpoint/2010/main" Requires="p14">
+  <mc:AlternateContent xmlns:mc="http://schemas.openxmlformats.org/markup-compatibility/2006" xmlns:p14="http://schemas.microsoft.com/office/powerpoint/2010/main">
+    <mc:Choice Requires="p14">
       <p:transition p14:dur="0"/>
     </mc:Choice>
-    <mc:Fallback>
+    <mc:Fallback xmlns="">
       <p:transition/>
     </mc:Fallback>
   </mc:AlternateContent>
@@ -4711,11 +4711,11 @@
   <p:clrMapOvr>
     <a:masterClrMapping/>
   </p:clrMapOvr>
-  <mc:AlternateContent xmlns:mc="http://schemas.openxmlformats.org/markup-compatibility/2006">
-    <mc:Choice xmlns:p14="http://schemas.microsoft.com/office/powerpoint/2010/main" Requires="p14">
+  <mc:AlternateContent xmlns:mc="http://schemas.openxmlformats.org/markup-compatibility/2006" xmlns:p14="http://schemas.microsoft.com/office/powerpoint/2010/main">
+    <mc:Choice Requires="p14">
       <p:transition p14:dur="0"/>
     </mc:Choice>
-    <mc:Fallback>
+    <mc:Fallback xmlns="">
       <p:transition/>
     </mc:Fallback>
   </mc:AlternateContent>
@@ -4749,11 +4749,11 @@
   <p:clrMapOvr>
     <a:masterClrMapping/>
   </p:clrMapOvr>
-  <mc:AlternateContent xmlns:mc="http://schemas.openxmlformats.org/markup-compatibility/2006">
-    <mc:Choice xmlns:p14="http://schemas.microsoft.com/office/powerpoint/2010/main" Requires="p14">
+  <mc:AlternateContent xmlns:mc="http://schemas.openxmlformats.org/markup-compatibility/2006" xmlns:p14="http://schemas.microsoft.com/office/powerpoint/2010/main">
+    <mc:Choice Requires="p14">
       <p:transition p14:dur="0"/>
     </mc:Choice>
-    <mc:Fallback>
+    <mc:Fallback xmlns="">
       <p:transition/>
     </mc:Fallback>
   </mc:AlternateContent>
@@ -4875,11 +4875,11 @@
   <p:clrMapOvr>
     <a:masterClrMapping/>
   </p:clrMapOvr>
-  <mc:AlternateContent xmlns:mc="http://schemas.openxmlformats.org/markup-compatibility/2006">
-    <mc:Choice xmlns:p14="http://schemas.microsoft.com/office/powerpoint/2010/main" Requires="p14">
+  <mc:AlternateContent xmlns:mc="http://schemas.openxmlformats.org/markup-compatibility/2006" xmlns:p14="http://schemas.microsoft.com/office/powerpoint/2010/main">
+    <mc:Choice Requires="p14">
       <p:transition p14:dur="0"/>
     </mc:Choice>
-    <mc:Fallback>
+    <mc:Fallback xmlns="">
       <p:transition/>
     </mc:Fallback>
   </mc:AlternateContent>
@@ -5117,11 +5117,11 @@
   <p:clrMapOvr>
     <a:masterClrMapping/>
   </p:clrMapOvr>
-  <mc:AlternateContent xmlns:mc="http://schemas.openxmlformats.org/markup-compatibility/2006">
-    <mc:Choice xmlns:p14="http://schemas.microsoft.com/office/powerpoint/2010/main" Requires="p14">
+  <mc:AlternateContent xmlns:mc="http://schemas.openxmlformats.org/markup-compatibility/2006" xmlns:p14="http://schemas.microsoft.com/office/powerpoint/2010/main">
+    <mc:Choice Requires="p14">
       <p:transition p14:dur="0"/>
     </mc:Choice>
-    <mc:Fallback>
+    <mc:Fallback xmlns="">
       <p:transition/>
     </mc:Fallback>
   </mc:AlternateContent>
@@ -5494,11 +5494,11 @@
   <p:clrMapOvr>
     <a:masterClrMapping/>
   </p:clrMapOvr>
-  <mc:AlternateContent xmlns:mc="http://schemas.openxmlformats.org/markup-compatibility/2006">
-    <mc:Choice xmlns:p14="http://schemas.microsoft.com/office/powerpoint/2010/main" Requires="p14">
+  <mc:AlternateContent xmlns:mc="http://schemas.openxmlformats.org/markup-compatibility/2006" xmlns:p14="http://schemas.microsoft.com/office/powerpoint/2010/main">
+    <mc:Choice Requires="p14">
       <p:transition p14:dur="0"/>
     </mc:Choice>
-    <mc:Fallback>
+    <mc:Fallback xmlns="">
       <p:transition/>
     </mc:Fallback>
   </mc:AlternateContent>
@@ -5834,11 +5834,11 @@
   <p:clrMapOvr>
     <a:masterClrMapping/>
   </p:clrMapOvr>
-  <mc:AlternateContent xmlns:mc="http://schemas.openxmlformats.org/markup-compatibility/2006">
-    <mc:Choice xmlns:p14="http://schemas.microsoft.com/office/powerpoint/2010/main" Requires="p14">
+  <mc:AlternateContent xmlns:mc="http://schemas.openxmlformats.org/markup-compatibility/2006" xmlns:p14="http://schemas.microsoft.com/office/powerpoint/2010/main">
+    <mc:Choice Requires="p14">
       <p:transition p14:dur="0"/>
     </mc:Choice>
-    <mc:Fallback>
+    <mc:Fallback xmlns="">
       <p:transition/>
     </mc:Fallback>
   </mc:AlternateContent>
@@ -6410,11 +6410,11 @@
   <p:clrMapOvr>
     <a:masterClrMapping/>
   </p:clrMapOvr>
-  <mc:AlternateContent xmlns:mc="http://schemas.openxmlformats.org/markup-compatibility/2006">
-    <mc:Choice xmlns:p14="http://schemas.microsoft.com/office/powerpoint/2010/main" Requires="p14">
+  <mc:AlternateContent xmlns:mc="http://schemas.openxmlformats.org/markup-compatibility/2006" xmlns:p14="http://schemas.microsoft.com/office/powerpoint/2010/main">
+    <mc:Choice Requires="p14">
       <p:transition p14:dur="0"/>
     </mc:Choice>
-    <mc:Fallback>
+    <mc:Fallback xmlns="">
       <p:transition/>
     </mc:Fallback>
   </mc:AlternateContent>
@@ -7186,11 +7186,11 @@
   <p:clrMapOvr>
     <a:masterClrMapping/>
   </p:clrMapOvr>
-  <mc:AlternateContent xmlns:mc="http://schemas.openxmlformats.org/markup-compatibility/2006">
-    <mc:Choice xmlns:p14="http://schemas.microsoft.com/office/powerpoint/2010/main" Requires="p14">
+  <mc:AlternateContent xmlns:mc="http://schemas.openxmlformats.org/markup-compatibility/2006" xmlns:p14="http://schemas.microsoft.com/office/powerpoint/2010/main">
+    <mc:Choice Requires="p14">
       <p:transition p14:dur="0"/>
     </mc:Choice>
-    <mc:Fallback>
+    <mc:Fallback xmlns="">
       <p:transition/>
     </mc:Fallback>
   </mc:AlternateContent>
@@ -7428,11 +7428,11 @@
   <p:clrMapOvr>
     <a:masterClrMapping/>
   </p:clrMapOvr>
-  <mc:AlternateContent xmlns:mc="http://schemas.openxmlformats.org/markup-compatibility/2006">
-    <mc:Choice xmlns:p14="http://schemas.microsoft.com/office/powerpoint/2010/main" Requires="p14">
+  <mc:AlternateContent xmlns:mc="http://schemas.openxmlformats.org/markup-compatibility/2006" xmlns:p14="http://schemas.microsoft.com/office/powerpoint/2010/main">
+    <mc:Choice Requires="p14">
       <p:transition p14:dur="0"/>
     </mc:Choice>
-    <mc:Fallback>
+    <mc:Fallback xmlns="">
       <p:transition/>
     </mc:Fallback>
   </mc:AlternateContent>
@@ -7622,11 +7622,11 @@
   <p:clrMapOvr>
     <a:masterClrMapping/>
   </p:clrMapOvr>
-  <mc:AlternateContent xmlns:mc="http://schemas.openxmlformats.org/markup-compatibility/2006">
-    <mc:Choice xmlns:p14="http://schemas.microsoft.com/office/powerpoint/2010/main" Requires="p14">
+  <mc:AlternateContent xmlns:mc="http://schemas.openxmlformats.org/markup-compatibility/2006" xmlns:p14="http://schemas.microsoft.com/office/powerpoint/2010/main">
+    <mc:Choice Requires="p14">
       <p:transition p14:dur="0"/>
     </mc:Choice>
-    <mc:Fallback>
+    <mc:Fallback xmlns="">
       <p:transition/>
     </mc:Fallback>
   </mc:AlternateContent>
@@ -7756,11 +7756,11 @@
   <p:clrMapOvr>
     <a:masterClrMapping/>
   </p:clrMapOvr>
-  <mc:AlternateContent xmlns:mc="http://schemas.openxmlformats.org/markup-compatibility/2006">
-    <mc:Choice xmlns:p14="http://schemas.microsoft.com/office/powerpoint/2010/main" Requires="p14">
+  <mc:AlternateContent xmlns:mc="http://schemas.openxmlformats.org/markup-compatibility/2006" xmlns:p14="http://schemas.microsoft.com/office/powerpoint/2010/main">
+    <mc:Choice Requires="p14">
       <p:transition p14:dur="0"/>
     </mc:Choice>
-    <mc:Fallback>
+    <mc:Fallback xmlns="">
       <p:transition/>
     </mc:Fallback>
   </mc:AlternateContent>
@@ -7794,11 +7794,11 @@
   <p:clrMapOvr>
     <a:masterClrMapping/>
   </p:clrMapOvr>
-  <mc:AlternateContent xmlns:mc="http://schemas.openxmlformats.org/markup-compatibility/2006">
-    <mc:Choice xmlns:p14="http://schemas.microsoft.com/office/powerpoint/2010/main" Requires="p14">
+  <mc:AlternateContent xmlns:mc="http://schemas.openxmlformats.org/markup-compatibility/2006" xmlns:p14="http://schemas.microsoft.com/office/powerpoint/2010/main">
+    <mc:Choice Requires="p14">
       <p:transition p14:dur="0"/>
     </mc:Choice>
-    <mc:Fallback>
+    <mc:Fallback xmlns="">
       <p:transition/>
     </mc:Fallback>
   </mc:AlternateContent>
@@ -7920,11 +7920,11 @@
   <p:clrMapOvr>
     <a:masterClrMapping/>
   </p:clrMapOvr>
-  <mc:AlternateContent xmlns:mc="http://schemas.openxmlformats.org/markup-compatibility/2006">
-    <mc:Choice xmlns:p14="http://schemas.microsoft.com/office/powerpoint/2010/main" Requires="p14">
+  <mc:AlternateContent xmlns:mc="http://schemas.openxmlformats.org/markup-compatibility/2006" xmlns:p14="http://schemas.microsoft.com/office/powerpoint/2010/main">
+    <mc:Choice Requires="p14">
       <p:transition p14:dur="0"/>
     </mc:Choice>
-    <mc:Fallback>
+    <mc:Fallback xmlns="">
       <p:transition/>
     </mc:Fallback>
   </mc:AlternateContent>
@@ -8162,11 +8162,11 @@
   <p:clrMapOvr>
     <a:masterClrMapping/>
   </p:clrMapOvr>
-  <mc:AlternateContent xmlns:mc="http://schemas.openxmlformats.org/markup-compatibility/2006">
-    <mc:Choice xmlns:p14="http://schemas.microsoft.com/office/powerpoint/2010/main" Requires="p14">
+  <mc:AlternateContent xmlns:mc="http://schemas.openxmlformats.org/markup-compatibility/2006" xmlns:p14="http://schemas.microsoft.com/office/powerpoint/2010/main">
+    <mc:Choice Requires="p14">
       <p:transition p14:dur="0"/>
     </mc:Choice>
-    <mc:Fallback>
+    <mc:Fallback xmlns="">
       <p:transition/>
     </mc:Fallback>
   </mc:AlternateContent>
@@ -8539,11 +8539,11 @@
   <p:clrMapOvr>
     <a:masterClrMapping/>
   </p:clrMapOvr>
-  <mc:AlternateContent xmlns:mc="http://schemas.openxmlformats.org/markup-compatibility/2006">
-    <mc:Choice xmlns:p14="http://schemas.microsoft.com/office/powerpoint/2010/main" Requires="p14">
+  <mc:AlternateContent xmlns:mc="http://schemas.openxmlformats.org/markup-compatibility/2006" xmlns:p14="http://schemas.microsoft.com/office/powerpoint/2010/main">
+    <mc:Choice Requires="p14">
       <p:transition p14:dur="0"/>
     </mc:Choice>
-    <mc:Fallback>
+    <mc:Fallback xmlns="">
       <p:transition/>
     </mc:Fallback>
   </mc:AlternateContent>
@@ -8708,11 +8708,11 @@
   <p:clrMapOvr>
     <a:masterClrMapping/>
   </p:clrMapOvr>
-  <mc:AlternateContent xmlns:mc="http://schemas.openxmlformats.org/markup-compatibility/2006">
-    <mc:Choice xmlns:p14="http://schemas.microsoft.com/office/powerpoint/2010/main" Requires="p14">
+  <mc:AlternateContent xmlns:mc="http://schemas.openxmlformats.org/markup-compatibility/2006" xmlns:p14="http://schemas.microsoft.com/office/powerpoint/2010/main">
+    <mc:Choice Requires="p14">
       <p:transition p14:dur="0"/>
     </mc:Choice>
-    <mc:Fallback>
+    <mc:Fallback xmlns="">
       <p:transition/>
     </mc:Fallback>
   </mc:AlternateContent>
@@ -9055,11 +9055,11 @@
   <p:clrMapOvr>
     <a:masterClrMapping/>
   </p:clrMapOvr>
-  <mc:AlternateContent xmlns:mc="http://schemas.openxmlformats.org/markup-compatibility/2006">
-    <mc:Choice xmlns:p14="http://schemas.microsoft.com/office/powerpoint/2010/main" Requires="p14">
+  <mc:AlternateContent xmlns:mc="http://schemas.openxmlformats.org/markup-compatibility/2006" xmlns:p14="http://schemas.microsoft.com/office/powerpoint/2010/main">
+    <mc:Choice Requires="p14">
       <p:transition p14:dur="0"/>
     </mc:Choice>
-    <mc:Fallback>
+    <mc:Fallback xmlns="">
       <p:transition/>
     </mc:Fallback>
   </mc:AlternateContent>
@@ -9631,11 +9631,11 @@
   <p:clrMapOvr>
     <a:masterClrMapping/>
   </p:clrMapOvr>
-  <mc:AlternateContent xmlns:mc="http://schemas.openxmlformats.org/markup-compatibility/2006">
-    <mc:Choice xmlns:p14="http://schemas.microsoft.com/office/powerpoint/2010/main" Requires="p14">
+  <mc:AlternateContent xmlns:mc="http://schemas.openxmlformats.org/markup-compatibility/2006" xmlns:p14="http://schemas.microsoft.com/office/powerpoint/2010/main">
+    <mc:Choice Requires="p14">
       <p:transition p14:dur="0"/>
     </mc:Choice>
-    <mc:Fallback>
+    <mc:Fallback xmlns="">
       <p:transition/>
     </mc:Fallback>
   </mc:AlternateContent>
@@ -10475,11 +10475,11 @@
   <p:clrMapOvr>
     <a:masterClrMapping/>
   </p:clrMapOvr>
-  <mc:AlternateContent xmlns:mc="http://schemas.openxmlformats.org/markup-compatibility/2006">
-    <mc:Choice xmlns:p14="http://schemas.microsoft.com/office/powerpoint/2010/main" Requires="p14">
+  <mc:AlternateContent xmlns:mc="http://schemas.openxmlformats.org/markup-compatibility/2006" xmlns:p14="http://schemas.microsoft.com/office/powerpoint/2010/main">
+    <mc:Choice Requires="p14">
       <p:transition p14:dur="0"/>
     </mc:Choice>
-    <mc:Fallback>
+    <mc:Fallback xmlns="">
       <p:transition/>
     </mc:Fallback>
   </mc:AlternateContent>
@@ -10657,11 +10657,11 @@
   <p:clrMapOvr>
     <a:masterClrMapping/>
   </p:clrMapOvr>
-  <mc:AlternateContent xmlns:mc="http://schemas.openxmlformats.org/markup-compatibility/2006">
-    <mc:Choice xmlns:p14="http://schemas.microsoft.com/office/powerpoint/2010/main" Requires="p14">
+  <mc:AlternateContent xmlns:mc="http://schemas.openxmlformats.org/markup-compatibility/2006" xmlns:p14="http://schemas.microsoft.com/office/powerpoint/2010/main">
+    <mc:Choice Requires="p14">
       <p:transition p14:dur="0"/>
     </mc:Choice>
-    <mc:Fallback>
+    <mc:Fallback xmlns="">
       <p:transition/>
     </mc:Fallback>
   </mc:AlternateContent>
@@ -10851,11 +10851,11 @@
   <p:clrMapOvr>
     <a:masterClrMapping/>
   </p:clrMapOvr>
-  <mc:AlternateContent xmlns:mc="http://schemas.openxmlformats.org/markup-compatibility/2006">
-    <mc:Choice xmlns:p14="http://schemas.microsoft.com/office/powerpoint/2010/main" Requires="p14">
+  <mc:AlternateContent xmlns:mc="http://schemas.openxmlformats.org/markup-compatibility/2006" xmlns:p14="http://schemas.microsoft.com/office/powerpoint/2010/main">
+    <mc:Choice Requires="p14">
       <p:transition p14:dur="0"/>
     </mc:Choice>
-    <mc:Fallback>
+    <mc:Fallback xmlns="">
       <p:transition/>
     </mc:Fallback>
   </mc:AlternateContent>
@@ -10985,11 +10985,11 @@
   <p:clrMapOvr>
     <a:masterClrMapping/>
   </p:clrMapOvr>
-  <mc:AlternateContent xmlns:mc="http://schemas.openxmlformats.org/markup-compatibility/2006">
-    <mc:Choice xmlns:p14="http://schemas.microsoft.com/office/powerpoint/2010/main" Requires="p14">
+  <mc:AlternateContent xmlns:mc="http://schemas.openxmlformats.org/markup-compatibility/2006" xmlns:p14="http://schemas.microsoft.com/office/powerpoint/2010/main">
+    <mc:Choice Requires="p14">
       <p:transition p14:dur="0"/>
     </mc:Choice>
-    <mc:Fallback>
+    <mc:Fallback xmlns="">
       <p:transition/>
     </mc:Fallback>
   </mc:AlternateContent>
@@ -11023,11 +11023,11 @@
   <p:clrMapOvr>
     <a:masterClrMapping/>
   </p:clrMapOvr>
-  <mc:AlternateContent xmlns:mc="http://schemas.openxmlformats.org/markup-compatibility/2006">
-    <mc:Choice xmlns:p14="http://schemas.microsoft.com/office/powerpoint/2010/main" Requires="p14">
+  <mc:AlternateContent xmlns:mc="http://schemas.openxmlformats.org/markup-compatibility/2006" xmlns:p14="http://schemas.microsoft.com/office/powerpoint/2010/main">
+    <mc:Choice Requires="p14">
       <p:transition p14:dur="0"/>
     </mc:Choice>
-    <mc:Fallback>
+    <mc:Fallback xmlns="">
       <p:transition/>
     </mc:Fallback>
   </mc:AlternateContent>
@@ -11149,11 +11149,11 @@
   <p:clrMapOvr>
     <a:masterClrMapping/>
   </p:clrMapOvr>
-  <mc:AlternateContent xmlns:mc="http://schemas.openxmlformats.org/markup-compatibility/2006">
-    <mc:Choice xmlns:p14="http://schemas.microsoft.com/office/powerpoint/2010/main" Requires="p14">
+  <mc:AlternateContent xmlns:mc="http://schemas.openxmlformats.org/markup-compatibility/2006" xmlns:p14="http://schemas.microsoft.com/office/powerpoint/2010/main">
+    <mc:Choice Requires="p14">
       <p:transition p14:dur="0"/>
     </mc:Choice>
-    <mc:Fallback>
+    <mc:Fallback xmlns="">
       <p:transition/>
     </mc:Fallback>
   </mc:AlternateContent>
@@ -11391,11 +11391,11 @@
   <p:clrMapOvr>
     <a:masterClrMapping/>
   </p:clrMapOvr>
-  <mc:AlternateContent xmlns:mc="http://schemas.openxmlformats.org/markup-compatibility/2006">
-    <mc:Choice xmlns:p14="http://schemas.microsoft.com/office/powerpoint/2010/main" Requires="p14">
+  <mc:AlternateContent xmlns:mc="http://schemas.openxmlformats.org/markup-compatibility/2006" xmlns:p14="http://schemas.microsoft.com/office/powerpoint/2010/main">
+    <mc:Choice Requires="p14">
       <p:transition p14:dur="0"/>
     </mc:Choice>
-    <mc:Fallback>
+    <mc:Fallback xmlns="">
       <p:transition/>
     </mc:Fallback>
   </mc:AlternateContent>
@@ -11768,11 +11768,11 @@
   <p:clrMapOvr>
     <a:masterClrMapping/>
   </p:clrMapOvr>
-  <mc:AlternateContent xmlns:mc="http://schemas.openxmlformats.org/markup-compatibility/2006">
-    <mc:Choice xmlns:p14="http://schemas.microsoft.com/office/powerpoint/2010/main" Requires="p14">
+  <mc:AlternateContent xmlns:mc="http://schemas.openxmlformats.org/markup-compatibility/2006" xmlns:p14="http://schemas.microsoft.com/office/powerpoint/2010/main">
+    <mc:Choice Requires="p14">
       <p:transition p14:dur="0"/>
     </mc:Choice>
-    <mc:Fallback>
+    <mc:Fallback xmlns="">
       <p:transition/>
     </mc:Fallback>
   </mc:AlternateContent>
@@ -11937,11 +11937,11 @@
   <p:clrMapOvr>
     <a:masterClrMapping/>
   </p:clrMapOvr>
-  <mc:AlternateContent xmlns:mc="http://schemas.openxmlformats.org/markup-compatibility/2006">
-    <mc:Choice xmlns:p14="http://schemas.microsoft.com/office/powerpoint/2010/main" Requires="p14">
+  <mc:AlternateContent xmlns:mc="http://schemas.openxmlformats.org/markup-compatibility/2006" xmlns:p14="http://schemas.microsoft.com/office/powerpoint/2010/main">
+    <mc:Choice Requires="p14">
       <p:transition p14:dur="0"/>
     </mc:Choice>
-    <mc:Fallback>
+    <mc:Fallback xmlns="">
       <p:transition/>
     </mc:Fallback>
   </mc:AlternateContent>
@@ -12046,7 +12046,7 @@
                 </a:solidFill>
               </a:rPr>
               <a:pPr/>
-              <a:t>6/10/2021</a:t>
+              <a:t>5/17/2022</a:t>
             </a:fld>
             <a:r>
               <a:rPr lang="en-US" smtClean="0">
@@ -12529,11 +12529,11 @@
   <p:clrMapOvr>
     <a:masterClrMapping/>
   </p:clrMapOvr>
-  <mc:AlternateContent xmlns:mc="http://schemas.openxmlformats.org/markup-compatibility/2006">
-    <mc:Choice xmlns:p14="http://schemas.microsoft.com/office/powerpoint/2010/main" Requires="p14">
+  <mc:AlternateContent xmlns:mc="http://schemas.openxmlformats.org/markup-compatibility/2006" xmlns:p14="http://schemas.microsoft.com/office/powerpoint/2010/main">
+    <mc:Choice Requires="p14">
       <p:transition p14:dur="0"/>
     </mc:Choice>
-    <mc:Fallback>
+    <mc:Fallback xmlns="">
       <p:transition/>
     </mc:Fallback>
   </mc:AlternateContent>
@@ -12705,11 +12705,11 @@
   <p:clrMapOvr>
     <a:masterClrMapping/>
   </p:clrMapOvr>
-  <mc:AlternateContent xmlns:mc="http://schemas.openxmlformats.org/markup-compatibility/2006">
-    <mc:Choice xmlns:p14="http://schemas.microsoft.com/office/powerpoint/2010/main" Requires="p14">
+  <mc:AlternateContent xmlns:mc="http://schemas.openxmlformats.org/markup-compatibility/2006" xmlns:p14="http://schemas.microsoft.com/office/powerpoint/2010/main">
+    <mc:Choice Requires="p14">
       <p:transition p14:dur="0"/>
     </mc:Choice>
-    <mc:Fallback>
+    <mc:Fallback xmlns="">
       <p:transition/>
     </mc:Fallback>
   </mc:AlternateContent>
@@ -12895,11 +12895,11 @@
   <p:clrMapOvr>
     <a:masterClrMapping/>
   </p:clrMapOvr>
-  <mc:AlternateContent xmlns:mc="http://schemas.openxmlformats.org/markup-compatibility/2006">
-    <mc:Choice xmlns:p14="http://schemas.microsoft.com/office/powerpoint/2010/main" Requires="p14">
+  <mc:AlternateContent xmlns:mc="http://schemas.openxmlformats.org/markup-compatibility/2006" xmlns:p14="http://schemas.microsoft.com/office/powerpoint/2010/main">
+    <mc:Choice Requires="p14">
       <p:transition p14:dur="0"/>
     </mc:Choice>
-    <mc:Fallback>
+    <mc:Fallback xmlns="">
       <p:transition/>
     </mc:Fallback>
   </mc:AlternateContent>
@@ -12981,11 +12981,11 @@
   <p:clrMapOvr>
     <a:masterClrMapping/>
   </p:clrMapOvr>
-  <mc:AlternateContent xmlns:mc="http://schemas.openxmlformats.org/markup-compatibility/2006">
-    <mc:Choice xmlns:p14="http://schemas.microsoft.com/office/powerpoint/2010/main" Requires="p14">
+  <mc:AlternateContent xmlns:mc="http://schemas.openxmlformats.org/markup-compatibility/2006" xmlns:p14="http://schemas.microsoft.com/office/powerpoint/2010/main">
+    <mc:Choice Requires="p14">
       <p:transition p14:dur="0"/>
     </mc:Choice>
-    <mc:Fallback>
+    <mc:Fallback xmlns="">
       <p:transition/>
     </mc:Fallback>
   </mc:AlternateContent>
@@ -13078,11 +13078,11 @@
   <p:clrMapOvr>
     <a:masterClrMapping/>
   </p:clrMapOvr>
-  <mc:AlternateContent xmlns:mc="http://schemas.openxmlformats.org/markup-compatibility/2006">
-    <mc:Choice xmlns:p14="http://schemas.microsoft.com/office/powerpoint/2010/main" Requires="p14">
+  <mc:AlternateContent xmlns:mc="http://schemas.openxmlformats.org/markup-compatibility/2006" xmlns:p14="http://schemas.microsoft.com/office/powerpoint/2010/main">
+    <mc:Choice Requires="p14">
       <p:transition p14:dur="0"/>
     </mc:Choice>
-    <mc:Fallback>
+    <mc:Fallback xmlns="">
       <p:transition/>
     </mc:Fallback>
   </mc:AlternateContent>
@@ -13539,11 +13539,11 @@
   <p:clrMapOvr>
     <a:masterClrMapping/>
   </p:clrMapOvr>
-  <mc:AlternateContent xmlns:mc="http://schemas.openxmlformats.org/markup-compatibility/2006">
-    <mc:Choice xmlns:p14="http://schemas.microsoft.com/office/powerpoint/2010/main" Requires="p14">
+  <mc:AlternateContent xmlns:mc="http://schemas.openxmlformats.org/markup-compatibility/2006" xmlns:p14="http://schemas.microsoft.com/office/powerpoint/2010/main">
+    <mc:Choice Requires="p14">
       <p:transition p14:dur="0"/>
     </mc:Choice>
-    <mc:Fallback>
+    <mc:Fallback xmlns="">
       <p:transition/>
     </mc:Fallback>
   </mc:AlternateContent>
@@ -14205,11 +14205,11 @@
   <p:clrMapOvr>
     <a:masterClrMapping/>
   </p:clrMapOvr>
-  <mc:AlternateContent xmlns:mc="http://schemas.openxmlformats.org/markup-compatibility/2006">
-    <mc:Choice xmlns:p14="http://schemas.microsoft.com/office/powerpoint/2010/main" Requires="p14">
+  <mc:AlternateContent xmlns:mc="http://schemas.openxmlformats.org/markup-compatibility/2006" xmlns:p14="http://schemas.microsoft.com/office/powerpoint/2010/main">
+    <mc:Choice Requires="p14">
       <p:transition p14:dur="0"/>
     </mc:Choice>
-    <mc:Fallback>
+    <mc:Fallback xmlns="">
       <p:transition/>
     </mc:Fallback>
   </mc:AlternateContent>
@@ -14474,11 +14474,11 @@
   <p:clrMapOvr>
     <a:masterClrMapping/>
   </p:clrMapOvr>
-  <mc:AlternateContent xmlns:mc="http://schemas.openxmlformats.org/markup-compatibility/2006">
-    <mc:Choice xmlns:p14="http://schemas.microsoft.com/office/powerpoint/2010/main" Requires="p14">
+  <mc:AlternateContent xmlns:mc="http://schemas.openxmlformats.org/markup-compatibility/2006" xmlns:p14="http://schemas.microsoft.com/office/powerpoint/2010/main">
+    <mc:Choice Requires="p14">
       <p:transition p14:dur="0"/>
     </mc:Choice>
-    <mc:Fallback>
+    <mc:Fallback xmlns="">
       <p:transition/>
     </mc:Fallback>
   </mc:AlternateContent>
@@ -14682,11 +14682,11 @@
   <p:clrMapOvr>
     <a:masterClrMapping/>
   </p:clrMapOvr>
-  <mc:AlternateContent xmlns:mc="http://schemas.openxmlformats.org/markup-compatibility/2006">
-    <mc:Choice xmlns:p14="http://schemas.microsoft.com/office/powerpoint/2010/main" Requires="p14">
+  <mc:AlternateContent xmlns:mc="http://schemas.openxmlformats.org/markup-compatibility/2006" xmlns:p14="http://schemas.microsoft.com/office/powerpoint/2010/main">
+    <mc:Choice Requires="p14">
       <p:transition p14:dur="0"/>
     </mc:Choice>
-    <mc:Fallback>
+    <mc:Fallback xmlns="">
       <p:transition/>
     </mc:Fallback>
   </mc:AlternateContent>
@@ -14793,11 +14793,11 @@
   <p:clrMapOvr>
     <a:masterClrMapping/>
   </p:clrMapOvr>
-  <mc:AlternateContent xmlns:mc="http://schemas.openxmlformats.org/markup-compatibility/2006">
-    <mc:Choice xmlns:p14="http://schemas.microsoft.com/office/powerpoint/2010/main" Requires="p14">
+  <mc:AlternateContent xmlns:mc="http://schemas.openxmlformats.org/markup-compatibility/2006" xmlns:p14="http://schemas.microsoft.com/office/powerpoint/2010/main">
+    <mc:Choice Requires="p14">
       <p:transition p14:dur="0"/>
     </mc:Choice>
-    <mc:Fallback>
+    <mc:Fallback xmlns="">
       <p:transition/>
     </mc:Fallback>
   </mc:AlternateContent>
@@ -14999,11 +14999,11 @@
   <p:clrMapOvr>
     <a:masterClrMapping/>
   </p:clrMapOvr>
-  <mc:AlternateContent xmlns:mc="http://schemas.openxmlformats.org/markup-compatibility/2006">
-    <mc:Choice xmlns:p14="http://schemas.microsoft.com/office/powerpoint/2010/main" Requires="p14">
+  <mc:AlternateContent xmlns:mc="http://schemas.openxmlformats.org/markup-compatibility/2006" xmlns:p14="http://schemas.microsoft.com/office/powerpoint/2010/main">
+    <mc:Choice Requires="p14">
       <p:transition p14:dur="0"/>
     </mc:Choice>
-    <mc:Fallback>
+    <mc:Fallback xmlns="">
       <p:transition/>
     </mc:Fallback>
   </mc:AlternateContent>
@@ -15314,11 +15314,11 @@
   <p:clrMapOvr>
     <a:masterClrMapping/>
   </p:clrMapOvr>
-  <mc:AlternateContent xmlns:mc="http://schemas.openxmlformats.org/markup-compatibility/2006">
-    <mc:Choice xmlns:p14="http://schemas.microsoft.com/office/powerpoint/2010/main" Requires="p14">
+  <mc:AlternateContent xmlns:mc="http://schemas.openxmlformats.org/markup-compatibility/2006" xmlns:p14="http://schemas.microsoft.com/office/powerpoint/2010/main">
+    <mc:Choice Requires="p14">
       <p:transition p14:dur="0"/>
     </mc:Choice>
-    <mc:Fallback>
+    <mc:Fallback xmlns="">
       <p:transition/>
     </mc:Fallback>
   </mc:AlternateContent>
@@ -15765,11 +15765,11 @@
   <p:clrMapOvr>
     <a:masterClrMapping/>
   </p:clrMapOvr>
-  <mc:AlternateContent xmlns:mc="http://schemas.openxmlformats.org/markup-compatibility/2006">
-    <mc:Choice xmlns:p14="http://schemas.microsoft.com/office/powerpoint/2010/main" Requires="p14">
+  <mc:AlternateContent xmlns:mc="http://schemas.openxmlformats.org/markup-compatibility/2006" xmlns:p14="http://schemas.microsoft.com/office/powerpoint/2010/main">
+    <mc:Choice Requires="p14">
       <p:transition p14:dur="0"/>
     </mc:Choice>
-    <mc:Fallback>
+    <mc:Fallback xmlns="">
       <p:transition/>
     </mc:Fallback>
   </mc:AlternateContent>
@@ -16062,11 +16062,11 @@
   <p:clrMapOvr>
     <a:masterClrMapping/>
   </p:clrMapOvr>
-  <mc:AlternateContent xmlns:mc="http://schemas.openxmlformats.org/markup-compatibility/2006">
-    <mc:Choice xmlns:p14="http://schemas.microsoft.com/office/powerpoint/2010/main" Requires="p14">
+  <mc:AlternateContent xmlns:mc="http://schemas.openxmlformats.org/markup-compatibility/2006" xmlns:p14="http://schemas.microsoft.com/office/powerpoint/2010/main">
+    <mc:Choice Requires="p14">
       <p:transition p14:dur="0"/>
     </mc:Choice>
-    <mc:Fallback>
+    <mc:Fallback xmlns="">
       <p:transition/>
     </mc:Fallback>
   </mc:AlternateContent>
@@ -16487,11 +16487,11 @@
   <p:clrMapOvr>
     <a:masterClrMapping/>
   </p:clrMapOvr>
-  <mc:AlternateContent xmlns:mc="http://schemas.openxmlformats.org/markup-compatibility/2006">
-    <mc:Choice xmlns:p14="http://schemas.microsoft.com/office/powerpoint/2010/main" Requires="p14">
+  <mc:AlternateContent xmlns:mc="http://schemas.openxmlformats.org/markup-compatibility/2006" xmlns:p14="http://schemas.microsoft.com/office/powerpoint/2010/main">
+    <mc:Choice Requires="p14">
       <p:transition p14:dur="0"/>
     </mc:Choice>
-    <mc:Fallback>
+    <mc:Fallback xmlns="">
       <p:transition/>
     </mc:Fallback>
   </mc:AlternateContent>
@@ -16651,11 +16651,11 @@
   <p:clrMapOvr>
     <a:masterClrMapping/>
   </p:clrMapOvr>
-  <mc:AlternateContent xmlns:mc="http://schemas.openxmlformats.org/markup-compatibility/2006">
-    <mc:Choice xmlns:p14="http://schemas.microsoft.com/office/powerpoint/2010/main" Requires="p14">
+  <mc:AlternateContent xmlns:mc="http://schemas.openxmlformats.org/markup-compatibility/2006" xmlns:p14="http://schemas.microsoft.com/office/powerpoint/2010/main">
+    <mc:Choice Requires="p14">
       <p:transition p14:dur="0"/>
     </mc:Choice>
-    <mc:Fallback>
+    <mc:Fallback xmlns="">
       <p:transition/>
     </mc:Fallback>
   </mc:AlternateContent>
@@ -18736,11 +18736,11 @@
   <p:clrMapOvr>
     <a:masterClrMapping/>
   </p:clrMapOvr>
-  <mc:AlternateContent xmlns:mc="http://schemas.openxmlformats.org/markup-compatibility/2006">
-    <mc:Choice xmlns:p14="http://schemas.microsoft.com/office/powerpoint/2010/main" Requires="p14">
+  <mc:AlternateContent xmlns:mc="http://schemas.openxmlformats.org/markup-compatibility/2006" xmlns:p14="http://schemas.microsoft.com/office/powerpoint/2010/main">
+    <mc:Choice Requires="p14">
       <p:transition p14:dur="0"/>
     </mc:Choice>
-    <mc:Fallback>
+    <mc:Fallback xmlns="">
       <p:transition/>
     </mc:Fallback>
   </mc:AlternateContent>
@@ -21057,11 +21057,11 @@
   <p:clrMapOvr>
     <a:masterClrMapping/>
   </p:clrMapOvr>
-  <mc:AlternateContent xmlns:mc="http://schemas.openxmlformats.org/markup-compatibility/2006">
-    <mc:Choice xmlns:p14="http://schemas.microsoft.com/office/powerpoint/2010/main" Requires="p14">
+  <mc:AlternateContent xmlns:mc="http://schemas.openxmlformats.org/markup-compatibility/2006" xmlns:p14="http://schemas.microsoft.com/office/powerpoint/2010/main">
+    <mc:Choice Requires="p14">
       <p:transition p14:dur="0"/>
     </mc:Choice>
-    <mc:Fallback>
+    <mc:Fallback xmlns="">
       <p:transition/>
     </mc:Fallback>
   </mc:AlternateContent>
@@ -21706,11 +21706,11 @@
     <p:sldLayoutId id="2147483694" r:id="rId6"/>
     <p:sldLayoutId id="2147483738" r:id="rId7"/>
   </p:sldLayoutIdLst>
-  <mc:AlternateContent xmlns:mc="http://schemas.openxmlformats.org/markup-compatibility/2006">
-    <mc:Choice xmlns:p14="http://schemas.microsoft.com/office/powerpoint/2010/main" Requires="p14">
+  <mc:AlternateContent xmlns:mc="http://schemas.openxmlformats.org/markup-compatibility/2006" xmlns:p14="http://schemas.microsoft.com/office/powerpoint/2010/main">
+    <mc:Choice Requires="p14">
       <p:transition p14:dur="0"/>
     </mc:Choice>
-    <mc:Fallback>
+    <mc:Fallback xmlns="">
       <p:transition/>
     </mc:Fallback>
   </mc:AlternateContent>
@@ -24556,11 +24556,11 @@
     <p:sldLayoutId id="2147483706" r:id="rId8"/>
     <p:sldLayoutId id="2147483707" r:id="rId9"/>
   </p:sldLayoutIdLst>
-  <mc:AlternateContent xmlns:mc="http://schemas.openxmlformats.org/markup-compatibility/2006">
-    <mc:Choice xmlns:p14="http://schemas.microsoft.com/office/powerpoint/2010/main" Requires="p14">
+  <mc:AlternateContent xmlns:mc="http://schemas.openxmlformats.org/markup-compatibility/2006" xmlns:p14="http://schemas.microsoft.com/office/powerpoint/2010/main">
+    <mc:Choice Requires="p14">
       <p:transition p14:dur="0"/>
     </mc:Choice>
-    <mc:Fallback>
+    <mc:Fallback xmlns="">
       <p:transition/>
     </mc:Fallback>
   </mc:AlternateContent>
@@ -25635,11 +25635,11 @@
     <p:sldLayoutId id="2147483721" r:id="rId9"/>
     <p:sldLayoutId id="2147483722" r:id="rId10"/>
   </p:sldLayoutIdLst>
-  <mc:AlternateContent xmlns:mc="http://schemas.openxmlformats.org/markup-compatibility/2006">
-    <mc:Choice xmlns:p14="http://schemas.microsoft.com/office/powerpoint/2010/main" Requires="p14">
+  <mc:AlternateContent xmlns:mc="http://schemas.openxmlformats.org/markup-compatibility/2006" xmlns:p14="http://schemas.microsoft.com/office/powerpoint/2010/main">
+    <mc:Choice Requires="p14">
       <p:transition p14:dur="0"/>
     </mc:Choice>
-    <mc:Fallback>
+    <mc:Fallback xmlns="">
       <p:transition/>
     </mc:Fallback>
   </mc:AlternateContent>
@@ -26715,11 +26715,11 @@
     <p:sldLayoutId id="2147483735" r:id="rId10"/>
     <p:sldLayoutId id="2147483737" r:id="rId11"/>
   </p:sldLayoutIdLst>
-  <mc:AlternateContent xmlns:mc="http://schemas.openxmlformats.org/markup-compatibility/2006">
-    <mc:Choice xmlns:p14="http://schemas.microsoft.com/office/powerpoint/2010/main" Requires="p14">
+  <mc:AlternateContent xmlns:mc="http://schemas.openxmlformats.org/markup-compatibility/2006" xmlns:p14="http://schemas.microsoft.com/office/powerpoint/2010/main">
+    <mc:Choice Requires="p14">
       <p:transition p14:dur="0"/>
     </mc:Choice>
-    <mc:Fallback>
+    <mc:Fallback xmlns="">
       <p:transition/>
     </mc:Fallback>
   </mc:AlternateContent>
@@ -27502,11 +27502,11 @@
     <p:sldLayoutId id="2147483740" r:id="rId1"/>
     <p:sldLayoutId id="2147483741" r:id="rId2"/>
   </p:sldLayoutIdLst>
-  <mc:AlternateContent xmlns:mc="http://schemas.openxmlformats.org/markup-compatibility/2006">
-    <mc:Choice xmlns:p14="http://schemas.microsoft.com/office/powerpoint/2010/main" Requires="p14">
+  <mc:AlternateContent xmlns:mc="http://schemas.openxmlformats.org/markup-compatibility/2006" xmlns:p14="http://schemas.microsoft.com/office/powerpoint/2010/main">
+    <mc:Choice Requires="p14">
       <p:transition p14:dur="0"/>
     </mc:Choice>
-    <mc:Fallback>
+    <mc:Fallback xmlns="">
       <p:transition/>
     </mc:Fallback>
   </mc:AlternateContent>
@@ -28189,11 +28189,11 @@
     <p:sldLayoutId id="2147483751" r:id="rId8"/>
     <p:sldLayoutId id="2147483752" r:id="rId9"/>
   </p:sldLayoutIdLst>
-  <mc:AlternateContent xmlns:mc="http://schemas.openxmlformats.org/markup-compatibility/2006">
-    <mc:Choice xmlns:p14="http://schemas.microsoft.com/office/powerpoint/2010/main" Requires="p14">
+  <mc:AlternateContent xmlns:mc="http://schemas.openxmlformats.org/markup-compatibility/2006" xmlns:p14="http://schemas.microsoft.com/office/powerpoint/2010/main">
+    <mc:Choice Requires="p14">
       <p:transition p14:dur="0"/>
     </mc:Choice>
-    <mc:Fallback>
+    <mc:Fallback xmlns="">
       <p:transition/>
     </mc:Fallback>
   </mc:AlternateContent>
@@ -28865,11 +28865,11 @@
   <p:clrMapOvr>
     <a:masterClrMapping/>
   </p:clrMapOvr>
-  <mc:AlternateContent xmlns:mc="http://schemas.openxmlformats.org/markup-compatibility/2006">
-    <mc:Choice xmlns:p14="http://schemas.microsoft.com/office/powerpoint/2010/main" Requires="p14">
+  <mc:AlternateContent xmlns:mc="http://schemas.openxmlformats.org/markup-compatibility/2006" xmlns:p14="http://schemas.microsoft.com/office/powerpoint/2010/main">
+    <mc:Choice Requires="p14">
       <p:transition p14:dur="0"/>
     </mc:Choice>
-    <mc:Fallback>
+    <mc:Fallback xmlns="">
       <p:transition/>
     </mc:Fallback>
   </mc:AlternateContent>
@@ -31197,11 +31197,11 @@
   <p:clrMapOvr>
     <a:masterClrMapping/>
   </p:clrMapOvr>
-  <mc:AlternateContent xmlns:mc="http://schemas.openxmlformats.org/markup-compatibility/2006">
-    <mc:Choice xmlns:p14="http://schemas.microsoft.com/office/powerpoint/2010/main" Requires="p14">
+  <mc:AlternateContent xmlns:mc="http://schemas.openxmlformats.org/markup-compatibility/2006" xmlns:p14="http://schemas.microsoft.com/office/powerpoint/2010/main">
+    <mc:Choice Requires="p14">
       <p:transition p14:dur="0"/>
     </mc:Choice>
-    <mc:Fallback>
+    <mc:Fallback xmlns="">
       <p:transition/>
     </mc:Fallback>
   </mc:AlternateContent>
@@ -31425,11 +31425,11 @@
   <p:clrMapOvr>
     <a:masterClrMapping/>
   </p:clrMapOvr>
-  <mc:AlternateContent xmlns:mc="http://schemas.openxmlformats.org/markup-compatibility/2006">
-    <mc:Choice xmlns:p14="http://schemas.microsoft.com/office/powerpoint/2010/main" Requires="p14">
+  <mc:AlternateContent xmlns:mc="http://schemas.openxmlformats.org/markup-compatibility/2006" xmlns:p14="http://schemas.microsoft.com/office/powerpoint/2010/main">
+    <mc:Choice Requires="p14">
       <p:transition p14:dur="0"/>
     </mc:Choice>
-    <mc:Fallback>
+    <mc:Fallback xmlns="">
       <p:transition/>
     </mc:Fallback>
   </mc:AlternateContent>
@@ -34420,11 +34420,11 @@
   <p:clrMapOvr>
     <a:masterClrMapping/>
   </p:clrMapOvr>
-  <mc:AlternateContent xmlns:mc="http://schemas.openxmlformats.org/markup-compatibility/2006">
-    <mc:Choice xmlns:p14="http://schemas.microsoft.com/office/powerpoint/2010/main" Requires="p14">
+  <mc:AlternateContent xmlns:mc="http://schemas.openxmlformats.org/markup-compatibility/2006" xmlns:p14="http://schemas.microsoft.com/office/powerpoint/2010/main">
+    <mc:Choice Requires="p14">
       <p:transition p14:dur="0"/>
     </mc:Choice>
-    <mc:Fallback>
+    <mc:Fallback xmlns="">
       <p:transition/>
     </mc:Fallback>
   </mc:AlternateContent>
@@ -34677,11 +34677,11 @@
   <p:clrMapOvr>
     <a:masterClrMapping/>
   </p:clrMapOvr>
-  <mc:AlternateContent xmlns:mc="http://schemas.openxmlformats.org/markup-compatibility/2006">
-    <mc:Choice xmlns:p14="http://schemas.microsoft.com/office/powerpoint/2010/main" Requires="p14">
+  <mc:AlternateContent xmlns:mc="http://schemas.openxmlformats.org/markup-compatibility/2006" xmlns:p14="http://schemas.microsoft.com/office/powerpoint/2010/main">
+    <mc:Choice Requires="p14">
       <p:transition p14:dur="0"/>
     </mc:Choice>
-    <mc:Fallback>
+    <mc:Fallback xmlns="">
       <p:transition/>
     </mc:Fallback>
   </mc:AlternateContent>
@@ -34853,11 +34853,11 @@
   <p:clrMapOvr>
     <a:masterClrMapping/>
   </p:clrMapOvr>
-  <mc:AlternateContent xmlns:mc="http://schemas.openxmlformats.org/markup-compatibility/2006">
-    <mc:Choice xmlns:p14="http://schemas.microsoft.com/office/powerpoint/2010/main" Requires="p14">
+  <mc:AlternateContent xmlns:mc="http://schemas.openxmlformats.org/markup-compatibility/2006" xmlns:p14="http://schemas.microsoft.com/office/powerpoint/2010/main">
+    <mc:Choice Requires="p14">
       <p:transition p14:dur="0"/>
     </mc:Choice>
-    <mc:Fallback>
+    <mc:Fallback xmlns="">
       <p:transition/>
     </mc:Fallback>
   </mc:AlternateContent>
@@ -35014,11 +35014,11 @@
   <p:clrMapOvr>
     <a:masterClrMapping/>
   </p:clrMapOvr>
-  <mc:AlternateContent xmlns:mc="http://schemas.openxmlformats.org/markup-compatibility/2006">
-    <mc:Choice xmlns:p14="http://schemas.microsoft.com/office/powerpoint/2010/main" Requires="p14">
+  <mc:AlternateContent xmlns:mc="http://schemas.openxmlformats.org/markup-compatibility/2006" xmlns:p14="http://schemas.microsoft.com/office/powerpoint/2010/main">
+    <mc:Choice Requires="p14">
       <p:transition p14:dur="0"/>
     </mc:Choice>
-    <mc:Fallback>
+    <mc:Fallback xmlns="">
       <p:transition/>
     </mc:Fallback>
   </mc:AlternateContent>
@@ -35202,11 +35202,11 @@
   <p:clrMapOvr>
     <a:masterClrMapping/>
   </p:clrMapOvr>
-  <mc:AlternateContent xmlns:mc="http://schemas.openxmlformats.org/markup-compatibility/2006">
-    <mc:Choice xmlns:p14="http://schemas.microsoft.com/office/powerpoint/2010/main" Requires="p14">
+  <mc:AlternateContent xmlns:mc="http://schemas.openxmlformats.org/markup-compatibility/2006" xmlns:p14="http://schemas.microsoft.com/office/powerpoint/2010/main">
+    <mc:Choice Requires="p14">
       <p:transition p14:dur="0"/>
     </mc:Choice>
-    <mc:Fallback>
+    <mc:Fallback xmlns="">
       <p:transition/>
     </mc:Fallback>
   </mc:AlternateContent>
@@ -35390,11 +35390,11 @@
   <p:clrMapOvr>
     <a:masterClrMapping/>
   </p:clrMapOvr>
-  <mc:AlternateContent xmlns:mc="http://schemas.openxmlformats.org/markup-compatibility/2006">
-    <mc:Choice xmlns:p14="http://schemas.microsoft.com/office/powerpoint/2010/main" Requires="p14">
+  <mc:AlternateContent xmlns:mc="http://schemas.openxmlformats.org/markup-compatibility/2006" xmlns:p14="http://schemas.microsoft.com/office/powerpoint/2010/main">
+    <mc:Choice Requires="p14">
       <p:transition p14:dur="0"/>
     </mc:Choice>
-    <mc:Fallback>
+    <mc:Fallback xmlns="">
       <p:transition/>
     </mc:Fallback>
   </mc:AlternateContent>
@@ -35609,11 +35609,11 @@
   <p:clrMapOvr>
     <a:masterClrMapping/>
   </p:clrMapOvr>
-  <mc:AlternateContent xmlns:mc="http://schemas.openxmlformats.org/markup-compatibility/2006">
-    <mc:Choice xmlns:p14="http://schemas.microsoft.com/office/powerpoint/2010/main" Requires="p14">
+  <mc:AlternateContent xmlns:mc="http://schemas.openxmlformats.org/markup-compatibility/2006" xmlns:p14="http://schemas.microsoft.com/office/powerpoint/2010/main">
+    <mc:Choice Requires="p14">
       <p:transition p14:dur="0"/>
     </mc:Choice>
-    <mc:Fallback>
+    <mc:Fallback xmlns="">
       <p:transition/>
     </mc:Fallback>
   </mc:AlternateContent>
@@ -35883,11 +35883,11 @@
   <p:clrMapOvr>
     <a:masterClrMapping/>
   </p:clrMapOvr>
-  <mc:AlternateContent xmlns:mc="http://schemas.openxmlformats.org/markup-compatibility/2006">
-    <mc:Choice xmlns:p14="http://schemas.microsoft.com/office/powerpoint/2010/main" Requires="p14">
+  <mc:AlternateContent xmlns:mc="http://schemas.openxmlformats.org/markup-compatibility/2006" xmlns:p14="http://schemas.microsoft.com/office/powerpoint/2010/main">
+    <mc:Choice Requires="p14">
       <p:transition p14:dur="0"/>
     </mc:Choice>
-    <mc:Fallback>
+    <mc:Fallback xmlns="">
       <p:transition/>
     </mc:Fallback>
   </mc:AlternateContent>
@@ -36025,11 +36025,11 @@
   <p:clrMapOvr>
     <a:masterClrMapping/>
   </p:clrMapOvr>
-  <mc:AlternateContent xmlns:mc="http://schemas.openxmlformats.org/markup-compatibility/2006">
-    <mc:Choice xmlns:p14="http://schemas.microsoft.com/office/powerpoint/2010/main" Requires="p14">
+  <mc:AlternateContent xmlns:mc="http://schemas.openxmlformats.org/markup-compatibility/2006" xmlns:p14="http://schemas.microsoft.com/office/powerpoint/2010/main">
+    <mc:Choice Requires="p14">
       <p:transition p14:dur="0"/>
     </mc:Choice>
-    <mc:Fallback>
+    <mc:Fallback xmlns="">
       <p:transition/>
     </mc:Fallback>
   </mc:AlternateContent>
@@ -36240,11 +36240,11 @@
   <p:clrMapOvr>
     <a:masterClrMapping/>
   </p:clrMapOvr>
-  <mc:AlternateContent xmlns:mc="http://schemas.openxmlformats.org/markup-compatibility/2006">
-    <mc:Choice xmlns:p14="http://schemas.microsoft.com/office/powerpoint/2010/main" Requires="p14">
+  <mc:AlternateContent xmlns:mc="http://schemas.openxmlformats.org/markup-compatibility/2006" xmlns:p14="http://schemas.microsoft.com/office/powerpoint/2010/main">
+    <mc:Choice Requires="p14">
       <p:transition p14:dur="0"/>
     </mc:Choice>
-    <mc:Fallback>
+    <mc:Fallback xmlns="">
       <p:transition/>
     </mc:Fallback>
   </mc:AlternateContent>
@@ -36437,11 +36437,11 @@
   <p:clrMapOvr>
     <a:masterClrMapping/>
   </p:clrMapOvr>
-  <mc:AlternateContent xmlns:mc="http://schemas.openxmlformats.org/markup-compatibility/2006">
-    <mc:Choice xmlns:p14="http://schemas.microsoft.com/office/powerpoint/2010/main" Requires="p14">
+  <mc:AlternateContent xmlns:mc="http://schemas.openxmlformats.org/markup-compatibility/2006" xmlns:p14="http://schemas.microsoft.com/office/powerpoint/2010/main">
+    <mc:Choice Requires="p14">
       <p:transition p14:dur="0"/>
     </mc:Choice>
-    <mc:Fallback>
+    <mc:Fallback xmlns="">
       <p:transition/>
     </mc:Fallback>
   </mc:AlternateContent>
@@ -36654,11 +36654,11 @@
   <p:clrMapOvr>
     <a:masterClrMapping/>
   </p:clrMapOvr>
-  <mc:AlternateContent xmlns:mc="http://schemas.openxmlformats.org/markup-compatibility/2006">
-    <mc:Choice xmlns:p14="http://schemas.microsoft.com/office/powerpoint/2010/main" Requires="p14">
+  <mc:AlternateContent xmlns:mc="http://schemas.openxmlformats.org/markup-compatibility/2006" xmlns:p14="http://schemas.microsoft.com/office/powerpoint/2010/main">
+    <mc:Choice Requires="p14">
       <p:transition p14:dur="0"/>
     </mc:Choice>
-    <mc:Fallback>
+    <mc:Fallback xmlns="">
       <p:transition/>
     </mc:Fallback>
   </mc:AlternateContent>
@@ -36799,11 +36799,11 @@
   <p:clrMapOvr>
     <a:masterClrMapping/>
   </p:clrMapOvr>
-  <mc:AlternateContent xmlns:mc="http://schemas.openxmlformats.org/markup-compatibility/2006">
-    <mc:Choice xmlns:p14="http://schemas.microsoft.com/office/powerpoint/2010/main" Requires="p14">
+  <mc:AlternateContent xmlns:mc="http://schemas.openxmlformats.org/markup-compatibility/2006" xmlns:p14="http://schemas.microsoft.com/office/powerpoint/2010/main">
+    <mc:Choice Requires="p14">
       <p:transition p14:dur="0"/>
     </mc:Choice>
-    <mc:Fallback>
+    <mc:Fallback xmlns="">
       <p:transition/>
     </mc:Fallback>
   </mc:AlternateContent>
@@ -37171,7 +37171,7 @@
               <a:buNone/>
             </a:pPr>
             <a:r>
-              <a:rPr lang="en-US" sz="2000" kern="0" smtClean="0">
+              <a:rPr lang="en-US" sz="2000" kern="0" dirty="0" smtClean="0">
                 <a:solidFill>
                   <a:srgbClr val="404040"/>
                 </a:solidFill>
@@ -37179,11 +37179,11 @@
               <a:t>The </a:t>
             </a:r>
             <a:r>
-              <a:rPr lang="en-US" sz="2000" kern="0" smtClean="0"/>
+              <a:rPr lang="en-US" sz="2000" kern="0" dirty="0" smtClean="0"/>
               <a:t>Open System Engineering Environment </a:t>
             </a:r>
             <a:r>
-              <a:rPr lang="en-US" sz="2000" kern="0" smtClean="0">
+              <a:rPr lang="en-US" sz="2000" kern="0" dirty="0" smtClean="0">
                 <a:solidFill>
                   <a:srgbClr val="404040"/>
                 </a:solidFill>
@@ -37566,11 +37566,11 @@
   <p:clrMapOvr>
     <a:masterClrMapping/>
   </p:clrMapOvr>
-  <mc:AlternateContent xmlns:mc="http://schemas.openxmlformats.org/markup-compatibility/2006">
-    <mc:Choice xmlns:p14="http://schemas.microsoft.com/office/powerpoint/2010/main" Requires="p14">
+  <mc:AlternateContent xmlns:mc="http://schemas.openxmlformats.org/markup-compatibility/2006" xmlns:p14="http://schemas.microsoft.com/office/powerpoint/2010/main">
+    <mc:Choice Requires="p14">
       <p:transition p14:dur="0"/>
     </mc:Choice>
-    <mc:Fallback>
+    <mc:Fallback xmlns="">
       <p:transition/>
     </mc:Fallback>
   </mc:AlternateContent>
@@ -37664,7 +37664,7 @@
         <p:spPr>
           <a:xfrm>
             <a:off x="603443" y="1335088"/>
-            <a:ext cx="10984732" cy="4773614"/>
+            <a:ext cx="10984732" cy="5179880"/>
           </a:xfrm>
         </p:spPr>
         <p:txBody>
@@ -37738,41 +37738,42 @@
           </a:p>
           <a:p>
             <a:r>
-              <a:rPr lang="en-US" smtClean="0"/>
-              <a:t>Data Rights </a:t>
-            </a:r>
-            <a:r>
               <a:rPr lang="en-US" dirty="0" smtClean="0"/>
-              <a:t>Management</a:t>
+              <a:t>Data Rights Management</a:t>
             </a:r>
             <a:endParaRPr lang="en-US" dirty="0"/>
           </a:p>
           <a:p>
             <a:r>
               <a:rPr lang="en-US" dirty="0" smtClean="0"/>
-              <a:t>Systems Safety Analysis</a:t>
-            </a:r>
-          </a:p>
-          <a:p>
+              <a:t>Systems Safety </a:t>
+            </a:r>
             <a:r>
               <a:rPr lang="en-US" dirty="0" smtClean="0"/>
-              <a:t>Full Lifecycle Traceability</a:t>
+              <a:t>Analysis</a:t>
+            </a:r>
+          </a:p>
+          <a:p>
+            <a:r>
+              <a:rPr lang="en-US" dirty="0"/>
+              <a:t>Mission System Message Management</a:t>
             </a:r>
           </a:p>
           <a:p>
             <a:r>
               <a:rPr lang="en-US" dirty="0" smtClean="0"/>
-              <a:t>High </a:t>
-            </a:r>
-            <a:r>
-              <a:rPr lang="en-US" dirty="0"/>
-              <a:t>availability access all life cycle </a:t>
+              <a:t>Full </a:t>
             </a:r>
             <a:r>
               <a:rPr lang="en-US" dirty="0" smtClean="0"/>
-              <a:t>data</a:t>
-            </a:r>
-            <a:endParaRPr lang="en-US" dirty="0"/>
+              <a:t>Lifecycle Traceability</a:t>
+            </a:r>
+          </a:p>
+          <a:p>
+            <a:r>
+              <a:rPr lang="en-US" dirty="0" smtClean="0"/>
+              <a:t>Easy access to all lifecycle data</a:t>
+            </a:r>
           </a:p>
         </p:txBody>
       </p:sp>
@@ -37786,11 +37787,11 @@
   <p:clrMapOvr>
     <a:masterClrMapping/>
   </p:clrMapOvr>
-  <mc:AlternateContent xmlns:mc="http://schemas.openxmlformats.org/markup-compatibility/2006">
-    <mc:Choice xmlns:p14="http://schemas.microsoft.com/office/powerpoint/2010/main" Requires="p14">
+  <mc:AlternateContent xmlns:mc="http://schemas.openxmlformats.org/markup-compatibility/2006" xmlns:p14="http://schemas.microsoft.com/office/powerpoint/2010/main">
+    <mc:Choice Requires="p14">
       <p:transition p14:dur="0"/>
     </mc:Choice>
-    <mc:Fallback>
+    <mc:Fallback xmlns="">
       <p:transition/>
     </mc:Fallback>
   </mc:AlternateContent>
@@ -37914,11 +37915,11 @@
   <p:clrMapOvr>
     <a:masterClrMapping/>
   </p:clrMapOvr>
-  <mc:AlternateContent xmlns:mc="http://schemas.openxmlformats.org/markup-compatibility/2006">
-    <mc:Choice xmlns:p14="http://schemas.microsoft.com/office/powerpoint/2010/main" Requires="p14">
+  <mc:AlternateContent xmlns:mc="http://schemas.openxmlformats.org/markup-compatibility/2006" xmlns:p14="http://schemas.microsoft.com/office/powerpoint/2010/main">
+    <mc:Choice Requires="p14">
       <p:transition p14:dur="0"/>
     </mc:Choice>
-    <mc:Fallback>
+    <mc:Fallback xmlns="">
       <p:transition/>
     </mc:Fallback>
   </mc:AlternateContent>
@@ -38110,11 +38111,11 @@
   <p:clrMapOvr>
     <a:masterClrMapping/>
   </p:clrMapOvr>
-  <mc:AlternateContent xmlns:mc="http://schemas.openxmlformats.org/markup-compatibility/2006">
-    <mc:Choice xmlns:p14="http://schemas.microsoft.com/office/powerpoint/2010/main" Requires="p14">
+  <mc:AlternateContent xmlns:mc="http://schemas.openxmlformats.org/markup-compatibility/2006" xmlns:p14="http://schemas.microsoft.com/office/powerpoint/2010/main">
+    <mc:Choice Requires="p14">
       <p:transition p14:dur="0"/>
     </mc:Choice>
-    <mc:Fallback>
+    <mc:Fallback xmlns="">
       <p:transition/>
     </mc:Fallback>
   </mc:AlternateContent>
@@ -38231,11 +38232,11 @@
   <p:clrMapOvr>
     <a:masterClrMapping/>
   </p:clrMapOvr>
-  <mc:AlternateContent xmlns:mc="http://schemas.openxmlformats.org/markup-compatibility/2006">
-    <mc:Choice xmlns:p14="http://schemas.microsoft.com/office/powerpoint/2010/main" Requires="p14">
+  <mc:AlternateContent xmlns:mc="http://schemas.openxmlformats.org/markup-compatibility/2006" xmlns:p14="http://schemas.microsoft.com/office/powerpoint/2010/main">
+    <mc:Choice Requires="p14">
       <p:transition p14:dur="0"/>
     </mc:Choice>
-    <mc:Fallback>
+    <mc:Fallback xmlns="">
       <p:transition/>
     </mc:Fallback>
   </mc:AlternateContent>
@@ -38412,11 +38413,11 @@
   <p:clrMapOvr>
     <a:masterClrMapping/>
   </p:clrMapOvr>
-  <mc:AlternateContent xmlns:mc="http://schemas.openxmlformats.org/markup-compatibility/2006">
-    <mc:Choice xmlns:p14="http://schemas.microsoft.com/office/powerpoint/2010/main" Requires="p14">
+  <mc:AlternateContent xmlns:mc="http://schemas.openxmlformats.org/markup-compatibility/2006" xmlns:p14="http://schemas.microsoft.com/office/powerpoint/2010/main">
+    <mc:Choice Requires="p14">
       <p:transition p14:dur="0"/>
     </mc:Choice>
-    <mc:Fallback>
+    <mc:Fallback xmlns="">
       <p:transition/>
     </mc:Fallback>
   </mc:AlternateContent>
@@ -38636,11 +38637,11 @@
   <p:clrMapOvr>
     <a:masterClrMapping/>
   </p:clrMapOvr>
-  <mc:AlternateContent xmlns:mc="http://schemas.openxmlformats.org/markup-compatibility/2006">
-    <mc:Choice xmlns:p14="http://schemas.microsoft.com/office/powerpoint/2010/main" Requires="p14">
+  <mc:AlternateContent xmlns:mc="http://schemas.openxmlformats.org/markup-compatibility/2006" xmlns:p14="http://schemas.microsoft.com/office/powerpoint/2010/main">
+    <mc:Choice Requires="p14">
       <p:transition p14:dur="0"/>
     </mc:Choice>
-    <mc:Fallback>
+    <mc:Fallback xmlns="">
       <p:transition/>
     </mc:Fallback>
   </mc:AlternateContent>
@@ -41469,6 +41470,12 @@
 </file>
 
 <file path=customXml/item2.xml><?xml version="1.0" encoding="utf-8"?>
+<p:properties xmlns:p="http://schemas.microsoft.com/office/2006/metadata/properties" xmlns:xsi="http://www.w3.org/2001/XMLSchema-instance" xmlns:pc="http://schemas.microsoft.com/office/infopath/2007/PartnerControls">
+  <documentManagement/>
+</p:properties>
+</file>
+
+<file path=customXml/item3.xml><?xml version="1.0" encoding="utf-8"?>
 <ct:contentTypeSchema xmlns:ct="http://schemas.microsoft.com/office/2006/metadata/contentType" xmlns:ma="http://schemas.microsoft.com/office/2006/metadata/properties/metaAttributes" ct:_="" ma:_="" ma:contentTypeName="Document" ma:contentTypeID="0x0101008A0B279ECBCCBE498CBB77428A3C0A70" ma:contentTypeVersion="0" ma:contentTypeDescription="Create a new document." ma:contentTypeScope="" ma:versionID="964677e00ef5c2311c798cf6a7469bcb">
   <xsd:schema xmlns:xsd="http://www.w3.org/2001/XMLSchema" xmlns:xs="http://www.w3.org/2001/XMLSchema" xmlns:p="http://schemas.microsoft.com/office/2006/metadata/properties" targetNamespace="http://schemas.microsoft.com/office/2006/metadata/properties" ma:root="true" ma:fieldsID="1b05d82d297216baf5b26c55225140df">
     <xsd:element name="properties">
@@ -41582,12 +41589,6 @@
 </ct:contentTypeSchema>
 </file>
 
-<file path=customXml/item3.xml><?xml version="1.0" encoding="utf-8"?>
-<p:properties xmlns:p="http://schemas.microsoft.com/office/2006/metadata/properties" xmlns:xsi="http://www.w3.org/2001/XMLSchema-instance" xmlns:pc="http://schemas.microsoft.com/office/infopath/2007/PartnerControls">
-  <documentManagement/>
-</p:properties>
-</file>
-
 <file path=customXml/itemProps1.xml><?xml version="1.0" encoding="utf-8"?>
 <ds:datastoreItem xmlns:ds="http://schemas.openxmlformats.org/officeDocument/2006/customXml" ds:itemID="{2C7B8F7B-FA54-4029-85C6-874BDE49F8B7}">
   <ds:schemaRefs>
@@ -41597,6 +41598,21 @@
 </file>
 
 <file path=customXml/itemProps2.xml><?xml version="1.0" encoding="utf-8"?>
+<ds:datastoreItem xmlns:ds="http://schemas.openxmlformats.org/officeDocument/2006/customXml" ds:itemID="{81CC6956-33F6-4FE5-A8DC-5120FA44C6E2}">
+  <ds:schemaRefs>
+    <ds:schemaRef ds:uri="http://schemas.microsoft.com/office/2006/metadata/properties"/>
+    <ds:schemaRef ds:uri="http://purl.org/dc/terms/"/>
+    <ds:schemaRef ds:uri="http://schemas.openxmlformats.org/package/2006/metadata/core-properties"/>
+    <ds:schemaRef ds:uri="http://schemas.microsoft.com/office/2006/documentManagement/types"/>
+    <ds:schemaRef ds:uri="http://schemas.microsoft.com/office/infopath/2007/PartnerControls"/>
+    <ds:schemaRef ds:uri="http://purl.org/dc/elements/1.1/"/>
+    <ds:schemaRef ds:uri="http://www.w3.org/XML/1998/namespace"/>
+    <ds:schemaRef ds:uri="http://purl.org/dc/dcmitype/"/>
+  </ds:schemaRefs>
+</ds:datastoreItem>
+</file>
+
+<file path=customXml/itemProps3.xml><?xml version="1.0" encoding="utf-8"?>
 <ds:datastoreItem xmlns:ds="http://schemas.openxmlformats.org/officeDocument/2006/customXml" ds:itemID="{D1C14E95-DCB1-426E-B7B2-4573F45D99A8}">
   <ds:schemaRefs>
     <ds:schemaRef ds:uri="http://schemas.microsoft.com/office/2006/metadata/contentType"/>
@@ -41610,19 +41626,4 @@
     <ds:schemaRef ds:uri="http://schemas.microsoft.com/office/infopath/2007/PartnerControls"/>
   </ds:schemaRefs>
 </ds:datastoreItem>
-</file>
-
-<file path=customXml/itemProps3.xml><?xml version="1.0" encoding="utf-8"?>
-<ds:datastoreItem xmlns:ds="http://schemas.openxmlformats.org/officeDocument/2006/customXml" ds:itemID="{81CC6956-33F6-4FE5-A8DC-5120FA44C6E2}">
-  <ds:schemaRefs>
-    <ds:schemaRef ds:uri="http://schemas.microsoft.com/office/2006/metadata/properties"/>
-    <ds:schemaRef ds:uri="http://purl.org/dc/terms/"/>
-    <ds:schemaRef ds:uri="http://schemas.openxmlformats.org/package/2006/metadata/core-properties"/>
-    <ds:schemaRef ds:uri="http://schemas.microsoft.com/office/2006/documentManagement/types"/>
-    <ds:schemaRef ds:uri="http://schemas.microsoft.com/office/infopath/2007/PartnerControls"/>
-    <ds:schemaRef ds:uri="http://purl.org/dc/elements/1.1/"/>
-    <ds:schemaRef ds:uri="http://www.w3.org/XML/1998/namespace"/>
-    <ds:schemaRef ds:uri="http://purl.org/dc/dcmitype/"/>
-  </ds:schemaRefs>
-</ds:datastoreItem>
 </file>
</xml_diff>